<commit_message>
Tweaked and improved the LI presentation slides.  Also, fixed some alignments in OCP Redux.
</commit_message>
<xml_diff>
--- a/Presentations/LI Redux.pptx
+++ b/Presentations/LI Redux.pptx
@@ -6360,14 +6360,14 @@
     </dgm:pt>
   </dgm:ptLst>
   <dgm:cxnLst>
+    <dgm:cxn modelId="{DF4FEABC-C28A-4AC9-9A4C-9FCDC306D76E}" srcId="{4C6D1B2F-93E7-4375-B36F-43D9AAAA776D}" destId="{5D98CFC8-1DF1-47F7-95E0-46A4AE044A8E}" srcOrd="0" destOrd="0" parTransId="{EC44B745-DA87-4195-B994-2EFA2C9C8609}" sibTransId="{BDDC0252-B0C2-4D97-9EB2-5D602C384113}"/>
+    <dgm:cxn modelId="{1959A118-ADE0-44B5-9287-016A34491E7E}" type="presOf" srcId="{4C6D1B2F-93E7-4375-B36F-43D9AAAA776D}" destId="{3B6D84A4-9FA2-4E45-8C4F-6B8C87BA97C8}" srcOrd="0" destOrd="0" presId="urn:microsoft.com/office/officeart/2005/8/layout/orgChart1"/>
+    <dgm:cxn modelId="{86670B4F-9855-4CFE-9BB0-E20DE07040D5}" type="presOf" srcId="{5F328E9B-9A9E-4EDC-BD6E-C0AE36317991}" destId="{44B9D6A4-3948-459B-9678-BA28B80A3774}" srcOrd="0" destOrd="0" presId="urn:microsoft.com/office/officeart/2005/8/layout/orgChart1"/>
     <dgm:cxn modelId="{0F7CB040-FB60-44BE-81E7-1BA90A21D05F}" srcId="{5D98CFC8-1DF1-47F7-95E0-46A4AE044A8E}" destId="{5F328E9B-9A9E-4EDC-BD6E-C0AE36317991}" srcOrd="0" destOrd="0" parTransId="{6271E463-6830-4FA9-9298-AA539E895393}" sibTransId="{D423AA21-E49E-42D8-9E77-1CB0FFDA9329}"/>
     <dgm:cxn modelId="{CBE67BB3-E677-4D86-A78F-A9C57C35203F}" type="presOf" srcId="{6271E463-6830-4FA9-9298-AA539E895393}" destId="{55060CFE-2EF2-4991-A1C0-681B04CF60EF}" srcOrd="0" destOrd="0" presId="urn:microsoft.com/office/officeart/2005/8/layout/orgChart1"/>
-    <dgm:cxn modelId="{DF4FEABC-C28A-4AC9-9A4C-9FCDC306D76E}" srcId="{4C6D1B2F-93E7-4375-B36F-43D9AAAA776D}" destId="{5D98CFC8-1DF1-47F7-95E0-46A4AE044A8E}" srcOrd="0" destOrd="0" parTransId="{EC44B745-DA87-4195-B994-2EFA2C9C8609}" sibTransId="{BDDC0252-B0C2-4D97-9EB2-5D602C384113}"/>
     <dgm:cxn modelId="{FA806679-F074-4E94-AF0B-955CD28E7F80}" type="presOf" srcId="{5D98CFC8-1DF1-47F7-95E0-46A4AE044A8E}" destId="{7590995D-AAD0-4EC8-BFE4-B3513DD6CE9B}" srcOrd="1" destOrd="0" presId="urn:microsoft.com/office/officeart/2005/8/layout/orgChart1"/>
+    <dgm:cxn modelId="{1F0AB053-09EF-443D-98FF-3EA69328F4CD}" type="presOf" srcId="{5F328E9B-9A9E-4EDC-BD6E-C0AE36317991}" destId="{A2DE044F-6BA1-4009-B126-BAEA303AE960}" srcOrd="1" destOrd="0" presId="urn:microsoft.com/office/officeart/2005/8/layout/orgChart1"/>
     <dgm:cxn modelId="{257925D1-EFFA-4F89-B82C-CB8EF45E4BFA}" type="presOf" srcId="{5D98CFC8-1DF1-47F7-95E0-46A4AE044A8E}" destId="{A028A06F-53B8-4DE4-BB82-B108A087DE1D}" srcOrd="0" destOrd="0" presId="urn:microsoft.com/office/officeart/2005/8/layout/orgChart1"/>
-    <dgm:cxn modelId="{1959A118-ADE0-44B5-9287-016A34491E7E}" type="presOf" srcId="{4C6D1B2F-93E7-4375-B36F-43D9AAAA776D}" destId="{3B6D84A4-9FA2-4E45-8C4F-6B8C87BA97C8}" srcOrd="0" destOrd="0" presId="urn:microsoft.com/office/officeart/2005/8/layout/orgChart1"/>
-    <dgm:cxn modelId="{1F0AB053-09EF-443D-98FF-3EA69328F4CD}" type="presOf" srcId="{5F328E9B-9A9E-4EDC-BD6E-C0AE36317991}" destId="{A2DE044F-6BA1-4009-B126-BAEA303AE960}" srcOrd="1" destOrd="0" presId="urn:microsoft.com/office/officeart/2005/8/layout/orgChart1"/>
-    <dgm:cxn modelId="{86670B4F-9855-4CFE-9BB0-E20DE07040D5}" type="presOf" srcId="{5F328E9B-9A9E-4EDC-BD6E-C0AE36317991}" destId="{44B9D6A4-3948-459B-9678-BA28B80A3774}" srcOrd="0" destOrd="0" presId="urn:microsoft.com/office/officeart/2005/8/layout/orgChart1"/>
     <dgm:cxn modelId="{D4DAD8D6-738A-4883-BD3A-C43D3B499520}" type="presParOf" srcId="{3B6D84A4-9FA2-4E45-8C4F-6B8C87BA97C8}" destId="{BA66BEB4-C990-4A96-A2EE-5EB334A751E8}" srcOrd="0" destOrd="0" presId="urn:microsoft.com/office/officeart/2005/8/layout/orgChart1"/>
     <dgm:cxn modelId="{8EAF12EF-A3DE-4A07-A3F9-DAC02D085537}" type="presParOf" srcId="{BA66BEB4-C990-4A96-A2EE-5EB334A751E8}" destId="{9EF67CBB-E1FD-4DEF-AB32-28F671385518}" srcOrd="0" destOrd="0" presId="urn:microsoft.com/office/officeart/2005/8/layout/orgChart1"/>
     <dgm:cxn modelId="{235AAFD3-1A90-4D7F-9BA7-2FADC774EB15}" type="presParOf" srcId="{9EF67CBB-E1FD-4DEF-AB32-28F671385518}" destId="{A028A06F-53B8-4DE4-BB82-B108A087DE1D}" srcOrd="0" destOrd="0" presId="urn:microsoft.com/office/officeart/2005/8/layout/orgChart1"/>
@@ -7054,7 +7054,7 @@
       <dgm:spPr/>
     </dgm:pt>
     <dgm:pt modelId="{DE84DD93-A530-4686-933C-FF082EAE8304}" type="pres">
-      <dgm:prSet presAssocID="{15DD8198-1C9F-4FA9-8394-597982486E4D}" presName="rootText1" presStyleLbl="node0" presStyleIdx="0" presStyleCnt="1" custScaleX="142493">
+      <dgm:prSet presAssocID="{15DD8198-1C9F-4FA9-8394-597982486E4D}" presName="rootText1" presStyleLbl="node0" presStyleIdx="0" presStyleCnt="1" custScaleX="142493" custLinFactNeighborX="39895">
         <dgm:presLayoutVars>
           <dgm:chPref val="3"/>
         </dgm:presLayoutVars>
@@ -7812,8 +7812,8 @@
     <dgm:cxn modelId="{703D20EB-622F-4E9C-B512-B5143204B0CC}" type="presOf" srcId="{578C571E-BE27-4447-A3EC-78D608C098C3}" destId="{22312ADC-841E-4C7A-8ADD-53B64A3573B9}" srcOrd="0" destOrd="0" presId="urn:microsoft.com/office/officeart/2005/8/layout/orgChart1"/>
     <dgm:cxn modelId="{0D0BF572-1951-4797-B98A-79CE5ED573B1}" type="presOf" srcId="{14A8950B-62A0-4DAD-925A-2905D54F7A1D}" destId="{6772950A-CC4A-43CF-B073-A94E441BF12F}" srcOrd="0" destOrd="0" presId="urn:microsoft.com/office/officeart/2005/8/layout/orgChart1"/>
     <dgm:cxn modelId="{04F51D5E-C346-4169-BC2A-FFEF313F600E}" type="presOf" srcId="{579E94D1-033B-4DA2-B32C-1647821EF2AB}" destId="{7102E2F5-67D0-4DA8-8C46-00C49A815814}" srcOrd="0" destOrd="0" presId="urn:microsoft.com/office/officeart/2005/8/layout/orgChart1"/>
+    <dgm:cxn modelId="{97063073-648E-443A-A06B-62F8EAAC6004}" type="presOf" srcId="{A12C770E-C026-4387-98DA-3E373E111460}" destId="{FAFA59A7-D689-4E6A-BB75-8AB35D5BCBA7}" srcOrd="1" destOrd="0" presId="urn:microsoft.com/office/officeart/2005/8/layout/orgChart1"/>
     <dgm:cxn modelId="{AC638ADC-CD3B-4A6C-BAFF-2521733E662E}" srcId="{A4AB3E7E-B97A-47AE-A3C9-AA94F2DE51DC}" destId="{A12C770E-C026-4387-98DA-3E373E111460}" srcOrd="2" destOrd="0" parTransId="{0AEE1635-CCFB-4CE9-81BB-0F878E49DD39}" sibTransId="{AF0AECD7-49C8-47AF-BE6A-7939717DFBE1}"/>
-    <dgm:cxn modelId="{97063073-648E-443A-A06B-62F8EAAC6004}" type="presOf" srcId="{A12C770E-C026-4387-98DA-3E373E111460}" destId="{FAFA59A7-D689-4E6A-BB75-8AB35D5BCBA7}" srcOrd="1" destOrd="0" presId="urn:microsoft.com/office/officeart/2005/8/layout/orgChart1"/>
     <dgm:cxn modelId="{2197537C-2AEC-446D-8615-917DE6A8B5CE}" type="presOf" srcId="{0AEE1635-CCFB-4CE9-81BB-0F878E49DD39}" destId="{C9B8A779-5E33-4C37-B3BB-0D5DA7306DB4}" srcOrd="0" destOrd="0" presId="urn:microsoft.com/office/officeart/2005/8/layout/orgChart1"/>
     <dgm:cxn modelId="{BB6D019D-5B72-48D9-A4B3-E9599D1C7BD8}" srcId="{A4AB3E7E-B97A-47AE-A3C9-AA94F2DE51DC}" destId="{282FC32B-7E81-497B-B786-C341BA87A2CD}" srcOrd="0" destOrd="0" parTransId="{578C571E-BE27-4447-A3EC-78D608C098C3}" sibTransId="{A0A4E59F-6D9E-4722-A7E0-B5E74FCCBD12}"/>
     <dgm:cxn modelId="{EE2A9286-3D45-4570-AC81-C73A7A20AAA3}" type="presOf" srcId="{A4AB3E7E-B97A-47AE-A3C9-AA94F2DE51DC}" destId="{2E20F05C-675B-42DF-A9B2-18379A2830D5}" srcOrd="0" destOrd="0" presId="urn:microsoft.com/office/officeart/2005/8/layout/orgChart1"/>
@@ -10593,32 +10593,32 @@
   </dgm:ptLst>
   <dgm:cxnLst>
     <dgm:cxn modelId="{7E90395A-E1A6-4DED-ABB7-04577D0E9E26}" srcId="{25CCFC31-0945-4996-A682-C538438BB52B}" destId="{9899BACF-FA62-42D8-914E-5580201D3E6E}" srcOrd="0" destOrd="0" parTransId="{672D74CB-D4CF-412E-86A4-ACA4A5BB2009}" sibTransId="{870E950A-3FA6-4C00-A304-62F9F7551BD9}"/>
-    <dgm:cxn modelId="{19DBB35F-D7A0-49A2-966F-7D6E4AF48B4B}" type="presOf" srcId="{06E45860-05CF-46F3-A727-7164BE32B0B0}" destId="{0E9257AF-3A88-499B-B8B0-573519ED7D65}" srcOrd="0" destOrd="0" presId="urn:microsoft.com/office/officeart/2005/8/layout/orgChart1"/>
-    <dgm:cxn modelId="{EC556F8B-5AB2-491A-AA6F-4C2B6A9C0A5D}" type="presOf" srcId="{B6D214D7-9050-4F9C-B4A0-7652862082EA}" destId="{6F55ED64-F36D-4124-ACE2-BD8DD5F2957D}" srcOrd="1" destOrd="0" presId="urn:microsoft.com/office/officeart/2005/8/layout/orgChart1"/>
-    <dgm:cxn modelId="{AEA03D2D-1BB3-4FC2-9586-D432ADF632BF}" type="presOf" srcId="{98E3C199-DE89-4B97-B4FD-98E87F8F53E2}" destId="{D8D9287B-F5B8-437E-A4A4-6CDD247DAEAE}" srcOrd="0" destOrd="0" presId="urn:microsoft.com/office/officeart/2005/8/layout/orgChart1"/>
-    <dgm:cxn modelId="{0923E8A7-C6A5-4C0A-808E-0F8159648CB0}" type="presOf" srcId="{672D74CB-D4CF-412E-86A4-ACA4A5BB2009}" destId="{F3CBE63C-F79F-4C69-8BA7-C5F552EB9DBC}" srcOrd="0" destOrd="0" presId="urn:microsoft.com/office/officeart/2005/8/layout/orgChart1"/>
-    <dgm:cxn modelId="{B7587F73-B2A3-4FD3-9B96-CEC9D9329CCD}" type="presOf" srcId="{25CCFC31-0945-4996-A682-C538438BB52B}" destId="{3047195B-8642-45E2-81D6-495D82B88FCA}" srcOrd="0" destOrd="0" presId="urn:microsoft.com/office/officeart/2005/8/layout/orgChart1"/>
-    <dgm:cxn modelId="{2C0DB530-A08E-4735-831C-0D9EA4AFA030}" type="presOf" srcId="{9899BACF-FA62-42D8-914E-5580201D3E6E}" destId="{BA928F33-D58B-4FA3-A358-58030AA8438D}" srcOrd="1" destOrd="0" presId="urn:microsoft.com/office/officeart/2005/8/layout/orgChart1"/>
-    <dgm:cxn modelId="{9B1C2B37-FECF-49D0-A6D8-4C85C5BF3B5E}" type="presOf" srcId="{9899BACF-FA62-42D8-914E-5580201D3E6E}" destId="{AF7D64D2-0691-4749-8216-78324B4770F6}" srcOrd="0" destOrd="0" presId="urn:microsoft.com/office/officeart/2005/8/layout/orgChart1"/>
-    <dgm:cxn modelId="{CB3EB739-9FF4-4741-8B0C-09F156E66FDA}" type="presOf" srcId="{06E45860-05CF-46F3-A727-7164BE32B0B0}" destId="{1AE15719-C6C1-4719-A4F7-3ABC58B54DDD}" srcOrd="1" destOrd="0" presId="urn:microsoft.com/office/officeart/2005/8/layout/orgChart1"/>
-    <dgm:cxn modelId="{E0A0332E-5108-41DA-85A5-B195FA2FA6BB}" type="presOf" srcId="{61850E55-ADD2-4411-8D73-2BD50B642847}" destId="{2358048C-E1D5-4FC4-8FDB-2E2E2CAA73CD}" srcOrd="1" destOrd="0" presId="urn:microsoft.com/office/officeart/2005/8/layout/orgChart1"/>
-    <dgm:cxn modelId="{4DE01695-83B5-467E-8A3E-766BEBA2607D}" type="presOf" srcId="{B6D214D7-9050-4F9C-B4A0-7652862082EA}" destId="{28A5AC14-A835-45DD-A04E-A6BC5F261C91}" srcOrd="0" destOrd="0" presId="urn:microsoft.com/office/officeart/2005/8/layout/orgChart1"/>
-    <dgm:cxn modelId="{4EC9B993-8D6F-4ED4-9DBA-3F95349CC251}" srcId="{A533C321-EF49-41BD-9F7F-1D00F5F2A1E4}" destId="{B6D214D7-9050-4F9C-B4A0-7652862082EA}" srcOrd="1" destOrd="0" parTransId="{A9B56752-6C68-4B30-93DC-1D12F661B939}" sibTransId="{58D2C5A1-501D-40EF-B11C-D06FD7BC7B17}"/>
-    <dgm:cxn modelId="{828C254A-D2D7-479A-B065-9465961FB0B0}" type="presOf" srcId="{721A7D10-D8BA-4B20-88C6-4F8A95EA434A}" destId="{B5176587-7DBE-47D0-971A-F5D95AD067F2}" srcOrd="0" destOrd="0" presId="urn:microsoft.com/office/officeart/2005/8/layout/orgChart1"/>
-    <dgm:cxn modelId="{7E5E2D4F-0466-4151-B2C8-CE9656BD96D2}" type="presOf" srcId="{A10DCA29-F747-46CF-A710-1A52868B6D65}" destId="{E9139A74-ED12-4EA0-B399-C7E2284DA0EF}" srcOrd="0" destOrd="0" presId="urn:microsoft.com/office/officeart/2005/8/layout/orgChart1"/>
-    <dgm:cxn modelId="{D7A2F854-759B-4775-88D3-36329190F55A}" srcId="{61850E55-ADD2-4411-8D73-2BD50B642847}" destId="{A533C321-EF49-41BD-9F7F-1D00F5F2A1E4}" srcOrd="0" destOrd="0" parTransId="{98E3C199-DE89-4B97-B4FD-98E87F8F53E2}" sibTransId="{32685EC0-8667-403C-8EE4-5BD8F798C64F}"/>
-    <dgm:cxn modelId="{11D29EEF-DBF4-4CCF-9B31-DC54694AF72B}" srcId="{A533C321-EF49-41BD-9F7F-1D00F5F2A1E4}" destId="{2060FE01-4AE3-40CD-8B3D-22D6BFF72F86}" srcOrd="0" destOrd="0" parTransId="{A10DCA29-F747-46CF-A710-1A52868B6D65}" sibTransId="{9C622940-FCC3-463A-B36A-E3FB06612FCB}"/>
+    <dgm:cxn modelId="{B9664BD0-D8F6-4814-9C52-AEBF631F1691}" type="presOf" srcId="{A533C321-EF49-41BD-9F7F-1D00F5F2A1E4}" destId="{152AA4C6-13C9-46E5-A1C4-470A8E17A32E}" srcOrd="0" destOrd="0" presId="urn:microsoft.com/office/officeart/2005/8/layout/orgChart1"/>
     <dgm:cxn modelId="{7B1C2CAA-F315-4A7A-B7EE-B87C0C4E0F5F}" type="presOf" srcId="{A9B56752-6C68-4B30-93DC-1D12F661B939}" destId="{D23F7A85-1910-48EB-A280-EBDEFC3B7DBA}" srcOrd="0" destOrd="0" presId="urn:microsoft.com/office/officeart/2005/8/layout/orgChart1"/>
     <dgm:cxn modelId="{4030C575-FA75-4236-A074-2447FFFFB4DD}" type="presOf" srcId="{A533C321-EF49-41BD-9F7F-1D00F5F2A1E4}" destId="{7CACBE22-A735-4BF9-9A12-AD1ED80D8EAE}" srcOrd="1" destOrd="0" presId="urn:microsoft.com/office/officeart/2005/8/layout/orgChart1"/>
+    <dgm:cxn modelId="{EC556F8B-5AB2-491A-AA6F-4C2B6A9C0A5D}" type="presOf" srcId="{B6D214D7-9050-4F9C-B4A0-7652862082EA}" destId="{6F55ED64-F36D-4124-ACE2-BD8DD5F2957D}" srcOrd="1" destOrd="0" presId="urn:microsoft.com/office/officeart/2005/8/layout/orgChart1"/>
+    <dgm:cxn modelId="{D7A2F854-759B-4775-88D3-36329190F55A}" srcId="{61850E55-ADD2-4411-8D73-2BD50B642847}" destId="{A533C321-EF49-41BD-9F7F-1D00F5F2A1E4}" srcOrd="0" destOrd="0" parTransId="{98E3C199-DE89-4B97-B4FD-98E87F8F53E2}" sibTransId="{32685EC0-8667-403C-8EE4-5BD8F798C64F}"/>
+    <dgm:cxn modelId="{6B7115E3-0C75-400B-B60C-6851AF68CA74}" srcId="{B031DAD4-69FD-42E4-818C-7AAFED58E368}" destId="{61850E55-ADD2-4411-8D73-2BD50B642847}" srcOrd="0" destOrd="0" parTransId="{077C90AE-5D62-49C3-B889-4DD360CD71C8}" sibTransId="{DBA72C9B-8E93-4148-8EC1-E6025B9EFC1B}"/>
+    <dgm:cxn modelId="{11D29EEF-DBF4-4CCF-9B31-DC54694AF72B}" srcId="{A533C321-EF49-41BD-9F7F-1D00F5F2A1E4}" destId="{2060FE01-4AE3-40CD-8B3D-22D6BFF72F86}" srcOrd="0" destOrd="0" parTransId="{A10DCA29-F747-46CF-A710-1A52868B6D65}" sibTransId="{9C622940-FCC3-463A-B36A-E3FB06612FCB}"/>
+    <dgm:cxn modelId="{E0A0332E-5108-41DA-85A5-B195FA2FA6BB}" type="presOf" srcId="{61850E55-ADD2-4411-8D73-2BD50B642847}" destId="{2358048C-E1D5-4FC4-8FDB-2E2E2CAA73CD}" srcOrd="1" destOrd="0" presId="urn:microsoft.com/office/officeart/2005/8/layout/orgChart1"/>
+    <dgm:cxn modelId="{0923E8A7-C6A5-4C0A-808E-0F8159648CB0}" type="presOf" srcId="{672D74CB-D4CF-412E-86A4-ACA4A5BB2009}" destId="{F3CBE63C-F79F-4C69-8BA7-C5F552EB9DBC}" srcOrd="0" destOrd="0" presId="urn:microsoft.com/office/officeart/2005/8/layout/orgChart1"/>
+    <dgm:cxn modelId="{47F1B640-2278-4569-B26A-1183BCD1841B}" type="presOf" srcId="{61850E55-ADD2-4411-8D73-2BD50B642847}" destId="{668C4EE9-2EBA-48C7-9832-0FA2683C1ABF}" srcOrd="0" destOrd="0" presId="urn:microsoft.com/office/officeart/2005/8/layout/orgChart1"/>
+    <dgm:cxn modelId="{4DE01695-83B5-467E-8A3E-766BEBA2607D}" type="presOf" srcId="{B6D214D7-9050-4F9C-B4A0-7652862082EA}" destId="{28A5AC14-A835-45DD-A04E-A6BC5F261C91}" srcOrd="0" destOrd="0" presId="urn:microsoft.com/office/officeart/2005/8/layout/orgChart1"/>
+    <dgm:cxn modelId="{AEA03D2D-1BB3-4FC2-9586-D432ADF632BF}" type="presOf" srcId="{98E3C199-DE89-4B97-B4FD-98E87F8F53E2}" destId="{D8D9287B-F5B8-437E-A4A4-6CDD247DAEAE}" srcOrd="0" destOrd="0" presId="urn:microsoft.com/office/officeart/2005/8/layout/orgChart1"/>
+    <dgm:cxn modelId="{757A661C-C725-446B-9F41-CA0F99005F85}" srcId="{B031DAD4-69FD-42E4-818C-7AAFED58E368}" destId="{06E45860-05CF-46F3-A727-7164BE32B0B0}" srcOrd="1" destOrd="0" parTransId="{D7A889F8-9FB0-4E20-AA68-9809E405F7C2}" sibTransId="{F47B8104-47ED-4F99-BFBD-A38F0FF2E90E}"/>
+    <dgm:cxn modelId="{828C254A-D2D7-479A-B065-9465961FB0B0}" type="presOf" srcId="{721A7D10-D8BA-4B20-88C6-4F8A95EA434A}" destId="{B5176587-7DBE-47D0-971A-F5D95AD067F2}" srcOrd="0" destOrd="0" presId="urn:microsoft.com/office/officeart/2005/8/layout/orgChart1"/>
+    <dgm:cxn modelId="{9B1C2B37-FECF-49D0-A6D8-4C85C5BF3B5E}" type="presOf" srcId="{9899BACF-FA62-42D8-914E-5580201D3E6E}" destId="{AF7D64D2-0691-4749-8216-78324B4770F6}" srcOrd="0" destOrd="0" presId="urn:microsoft.com/office/officeart/2005/8/layout/orgChart1"/>
+    <dgm:cxn modelId="{4EC9B993-8D6F-4ED4-9DBA-3F95349CC251}" srcId="{A533C321-EF49-41BD-9F7F-1D00F5F2A1E4}" destId="{B6D214D7-9050-4F9C-B4A0-7652862082EA}" srcOrd="1" destOrd="0" parTransId="{A9B56752-6C68-4B30-93DC-1D12F661B939}" sibTransId="{58D2C5A1-501D-40EF-B11C-D06FD7BC7B17}"/>
     <dgm:cxn modelId="{5E9EC71E-6877-46A7-A136-E0327BE67095}" srcId="{06E45860-05CF-46F3-A727-7164BE32B0B0}" destId="{25CCFC31-0945-4996-A682-C538438BB52B}" srcOrd="0" destOrd="0" parTransId="{721A7D10-D8BA-4B20-88C6-4F8A95EA434A}" sibTransId="{2CD2FF45-A0AB-448E-8ECF-0D507EA295C7}"/>
-    <dgm:cxn modelId="{B9664BD0-D8F6-4814-9C52-AEBF631F1691}" type="presOf" srcId="{A533C321-EF49-41BD-9F7F-1D00F5F2A1E4}" destId="{152AA4C6-13C9-46E5-A1C4-470A8E17A32E}" srcOrd="0" destOrd="0" presId="urn:microsoft.com/office/officeart/2005/8/layout/orgChart1"/>
-    <dgm:cxn modelId="{757A661C-C725-446B-9F41-CA0F99005F85}" srcId="{B031DAD4-69FD-42E4-818C-7AAFED58E368}" destId="{06E45860-05CF-46F3-A727-7164BE32B0B0}" srcOrd="1" destOrd="0" parTransId="{D7A889F8-9FB0-4E20-AA68-9809E405F7C2}" sibTransId="{F47B8104-47ED-4F99-BFBD-A38F0FF2E90E}"/>
+    <dgm:cxn modelId="{CD88BDF4-4C0E-424E-AD76-D37258C68201}" type="presOf" srcId="{2060FE01-4AE3-40CD-8B3D-22D6BFF72F86}" destId="{85CDDB2E-BA35-473D-AD81-A673775F16B9}" srcOrd="1" destOrd="0" presId="urn:microsoft.com/office/officeart/2005/8/layout/orgChart1"/>
     <dgm:cxn modelId="{CEAD0360-DB56-4D7A-9C91-E0D14445D45C}" type="presOf" srcId="{25CCFC31-0945-4996-A682-C538438BB52B}" destId="{ED4945D6-CAF2-4112-8000-3AE94495FA70}" srcOrd="1" destOrd="0" presId="urn:microsoft.com/office/officeart/2005/8/layout/orgChart1"/>
+    <dgm:cxn modelId="{19DBB35F-D7A0-49A2-966F-7D6E4AF48B4B}" type="presOf" srcId="{06E45860-05CF-46F3-A727-7164BE32B0B0}" destId="{0E9257AF-3A88-499B-B8B0-573519ED7D65}" srcOrd="0" destOrd="0" presId="urn:microsoft.com/office/officeart/2005/8/layout/orgChart1"/>
     <dgm:cxn modelId="{C83FAA1D-F9E8-49A8-AE39-3B758D58B350}" type="presOf" srcId="{2060FE01-4AE3-40CD-8B3D-22D6BFF72F86}" destId="{943882F0-E497-44DA-92CD-E8CAA46A4553}" srcOrd="0" destOrd="0" presId="urn:microsoft.com/office/officeart/2005/8/layout/orgChart1"/>
-    <dgm:cxn modelId="{CD88BDF4-4C0E-424E-AD76-D37258C68201}" type="presOf" srcId="{2060FE01-4AE3-40CD-8B3D-22D6BFF72F86}" destId="{85CDDB2E-BA35-473D-AD81-A673775F16B9}" srcOrd="1" destOrd="0" presId="urn:microsoft.com/office/officeart/2005/8/layout/orgChart1"/>
-    <dgm:cxn modelId="{47F1B640-2278-4569-B26A-1183BCD1841B}" type="presOf" srcId="{61850E55-ADD2-4411-8D73-2BD50B642847}" destId="{668C4EE9-2EBA-48C7-9832-0FA2683C1ABF}" srcOrd="0" destOrd="0" presId="urn:microsoft.com/office/officeart/2005/8/layout/orgChart1"/>
-    <dgm:cxn modelId="{6B7115E3-0C75-400B-B60C-6851AF68CA74}" srcId="{B031DAD4-69FD-42E4-818C-7AAFED58E368}" destId="{61850E55-ADD2-4411-8D73-2BD50B642847}" srcOrd="0" destOrd="0" parTransId="{077C90AE-5D62-49C3-B889-4DD360CD71C8}" sibTransId="{DBA72C9B-8E93-4148-8EC1-E6025B9EFC1B}"/>
     <dgm:cxn modelId="{E3127EFB-E0FC-42A6-A1DC-AF3C26D4BAD8}" type="presOf" srcId="{B031DAD4-69FD-42E4-818C-7AAFED58E368}" destId="{E11CD33F-4678-4909-AF34-0F435EBD7D9F}" srcOrd="0" destOrd="0" presId="urn:microsoft.com/office/officeart/2005/8/layout/orgChart1"/>
+    <dgm:cxn modelId="{7E5E2D4F-0466-4151-B2C8-CE9656BD96D2}" type="presOf" srcId="{A10DCA29-F747-46CF-A710-1A52868B6D65}" destId="{E9139A74-ED12-4EA0-B399-C7E2284DA0EF}" srcOrd="0" destOrd="0" presId="urn:microsoft.com/office/officeart/2005/8/layout/orgChart1"/>
+    <dgm:cxn modelId="{2C0DB530-A08E-4735-831C-0D9EA4AFA030}" type="presOf" srcId="{9899BACF-FA62-42D8-914E-5580201D3E6E}" destId="{BA928F33-D58B-4FA3-A358-58030AA8438D}" srcOrd="1" destOrd="0" presId="urn:microsoft.com/office/officeart/2005/8/layout/orgChart1"/>
+    <dgm:cxn modelId="{B7587F73-B2A3-4FD3-9B96-CEC9D9329CCD}" type="presOf" srcId="{25CCFC31-0945-4996-A682-C538438BB52B}" destId="{3047195B-8642-45E2-81D6-495D82B88FCA}" srcOrd="0" destOrd="0" presId="urn:microsoft.com/office/officeart/2005/8/layout/orgChart1"/>
+    <dgm:cxn modelId="{CB3EB739-9FF4-4741-8B0C-09F156E66FDA}" type="presOf" srcId="{06E45860-05CF-46F3-A727-7164BE32B0B0}" destId="{1AE15719-C6C1-4719-A4F7-3ABC58B54DDD}" srcOrd="1" destOrd="0" presId="urn:microsoft.com/office/officeart/2005/8/layout/orgChart1"/>
     <dgm:cxn modelId="{A277621A-2E4F-4C9B-ADC6-94414B8CA5CE}" type="presParOf" srcId="{E11CD33F-4678-4909-AF34-0F435EBD7D9F}" destId="{BEDB1216-5CBF-4419-BB87-57381499A871}" srcOrd="0" destOrd="0" presId="urn:microsoft.com/office/officeart/2005/8/layout/orgChart1"/>
     <dgm:cxn modelId="{B3238497-58E6-4A2D-B33D-44EE10CA6682}" type="presParOf" srcId="{BEDB1216-5CBF-4419-BB87-57381499A871}" destId="{9940A452-040D-4F0F-B392-842C7EFC645C}" srcOrd="0" destOrd="0" presId="urn:microsoft.com/office/officeart/2005/8/layout/orgChart1"/>
     <dgm:cxn modelId="{3AE8FF52-CF2F-4745-A712-1ACD554E9A6E}" type="presParOf" srcId="{9940A452-040D-4F0F-B392-842C7EFC645C}" destId="{668C4EE9-2EBA-48C7-9832-0FA2683C1ABF}" srcOrd="0" destOrd="0" presId="urn:microsoft.com/office/officeart/2005/8/layout/orgChart1"/>
@@ -11562,8 +11562,8 @@
       </dsp:nvSpPr>
       <dsp:spPr>
         <a:xfrm>
-          <a:off x="6600757" y="1133479"/>
-          <a:ext cx="1370705" cy="475782"/>
+          <a:off x="7504630" y="1133479"/>
+          <a:ext cx="466832" cy="475782"/>
         </a:xfrm>
         <a:custGeom>
           <a:avLst/>
@@ -11580,10 +11580,10 @@
                 <a:pt x="0" y="237891"/>
               </a:lnTo>
               <a:lnTo>
-                <a:pt x="1370705" y="237891"/>
+                <a:pt x="466832" y="237891"/>
               </a:lnTo>
               <a:lnTo>
-                <a:pt x="1370705" y="475782"/>
+                <a:pt x="466832" y="475782"/>
               </a:lnTo>
             </a:path>
           </a:pathLst>
@@ -11749,7 +11749,7 @@
       <dsp:spPr>
         <a:xfrm>
           <a:off x="5230051" y="1133479"/>
-          <a:ext cx="1370705" cy="475782"/>
+          <a:ext cx="2274578" cy="475782"/>
         </a:xfrm>
         <a:custGeom>
           <a:avLst/>
@@ -11760,10 +11760,10 @@
           <a:pathLst>
             <a:path>
               <a:moveTo>
-                <a:pt x="1370705" y="0"/>
+                <a:pt x="2274578" y="0"/>
               </a:moveTo>
               <a:lnTo>
-                <a:pt x="1370705" y="237891"/>
+                <a:pt x="2274578" y="237891"/>
               </a:lnTo>
               <a:lnTo>
                 <a:pt x="0" y="237891"/>
@@ -11810,7 +11810,7 @@
       </dsp:nvSpPr>
       <dsp:spPr>
         <a:xfrm>
-          <a:off x="4986575" y="665"/>
+          <a:off x="5890448" y="665"/>
           <a:ext cx="3228362" cy="1132814"/>
         </a:xfrm>
         <a:prstGeom prst="rect">
@@ -11877,7 +11877,7 @@
         </a:p>
       </dsp:txBody>
       <dsp:txXfrm>
-        <a:off x="4986575" y="665"/>
+        <a:off x="5890448" y="665"/>
         <a:ext cx="3228362" cy="1132814"/>
       </dsp:txXfrm>
     </dsp:sp>
@@ -33408,7 +33408,7 @@
           <a:p>
             <a:fld id="{D7D9A16F-D302-4F6C-88DE-469A6962F06E}" type="datetimeFigureOut">
               <a:rPr lang="en-US" smtClean="0"/>
-              <a:t>12/15/2014</a:t>
+              <a:t>1/2/2015</a:t>
             </a:fld>
             <a:endParaRPr lang="en-US"/>
           </a:p>
@@ -33975,7 +33975,7 @@
           <a:p>
             <a:fld id="{ABF9AFE4-9910-4F36-8626-ABF2E797B655}" type="datetimeFigureOut">
               <a:rPr lang="en-US" smtClean="0"/>
-              <a:t>12/15/2014</a:t>
+              <a:t>1/2/2015</a:t>
             </a:fld>
             <a:endParaRPr lang="en-US"/>
           </a:p>
@@ -34145,7 +34145,7 @@
           <a:p>
             <a:fld id="{ABF9AFE4-9910-4F36-8626-ABF2E797B655}" type="datetimeFigureOut">
               <a:rPr lang="en-US" smtClean="0"/>
-              <a:t>12/15/2014</a:t>
+              <a:t>1/2/2015</a:t>
             </a:fld>
             <a:endParaRPr lang="en-US"/>
           </a:p>
@@ -34325,7 +34325,7 @@
           <a:p>
             <a:fld id="{ABF9AFE4-9910-4F36-8626-ABF2E797B655}" type="datetimeFigureOut">
               <a:rPr lang="en-US" smtClean="0"/>
-              <a:t>12/15/2014</a:t>
+              <a:t>1/2/2015</a:t>
             </a:fld>
             <a:endParaRPr lang="en-US"/>
           </a:p>
@@ -34495,7 +34495,7 @@
           <a:p>
             <a:fld id="{ABF9AFE4-9910-4F36-8626-ABF2E797B655}" type="datetimeFigureOut">
               <a:rPr lang="en-US" smtClean="0"/>
-              <a:t>12/15/2014</a:t>
+              <a:t>1/2/2015</a:t>
             </a:fld>
             <a:endParaRPr lang="en-US"/>
           </a:p>
@@ -34741,7 +34741,7 @@
           <a:p>
             <a:fld id="{ABF9AFE4-9910-4F36-8626-ABF2E797B655}" type="datetimeFigureOut">
               <a:rPr lang="en-US" smtClean="0"/>
-              <a:t>12/15/2014</a:t>
+              <a:t>1/2/2015</a:t>
             </a:fld>
             <a:endParaRPr lang="en-US"/>
           </a:p>
@@ -34973,7 +34973,7 @@
           <a:p>
             <a:fld id="{ABF9AFE4-9910-4F36-8626-ABF2E797B655}" type="datetimeFigureOut">
               <a:rPr lang="en-US" smtClean="0"/>
-              <a:t>12/15/2014</a:t>
+              <a:t>1/2/2015</a:t>
             </a:fld>
             <a:endParaRPr lang="en-US"/>
           </a:p>
@@ -35340,7 +35340,7 @@
           <a:p>
             <a:fld id="{ABF9AFE4-9910-4F36-8626-ABF2E797B655}" type="datetimeFigureOut">
               <a:rPr lang="en-US" smtClean="0"/>
-              <a:t>12/15/2014</a:t>
+              <a:t>1/2/2015</a:t>
             </a:fld>
             <a:endParaRPr lang="en-US"/>
           </a:p>
@@ -35458,7 +35458,7 @@
           <a:p>
             <a:fld id="{ABF9AFE4-9910-4F36-8626-ABF2E797B655}" type="datetimeFigureOut">
               <a:rPr lang="en-US" smtClean="0"/>
-              <a:t>12/15/2014</a:t>
+              <a:t>1/2/2015</a:t>
             </a:fld>
             <a:endParaRPr lang="en-US"/>
           </a:p>
@@ -35553,7 +35553,7 @@
           <a:p>
             <a:fld id="{ABF9AFE4-9910-4F36-8626-ABF2E797B655}" type="datetimeFigureOut">
               <a:rPr lang="en-US" smtClean="0"/>
-              <a:t>12/15/2014</a:t>
+              <a:t>1/2/2015</a:t>
             </a:fld>
             <a:endParaRPr lang="en-US"/>
           </a:p>
@@ -35830,7 +35830,7 @@
           <a:p>
             <a:fld id="{ABF9AFE4-9910-4F36-8626-ABF2E797B655}" type="datetimeFigureOut">
               <a:rPr lang="en-US" smtClean="0"/>
-              <a:t>12/15/2014</a:t>
+              <a:t>1/2/2015</a:t>
             </a:fld>
             <a:endParaRPr lang="en-US"/>
           </a:p>
@@ -36083,7 +36083,7 @@
           <a:p>
             <a:fld id="{ABF9AFE4-9910-4F36-8626-ABF2E797B655}" type="datetimeFigureOut">
               <a:rPr lang="en-US" smtClean="0"/>
-              <a:t>12/15/2014</a:t>
+              <a:t>1/2/2015</a:t>
             </a:fld>
             <a:endParaRPr lang="en-US"/>
           </a:p>
@@ -36296,7 +36296,7 @@
           <a:p>
             <a:fld id="{ABF9AFE4-9910-4F36-8626-ABF2E797B655}" type="datetimeFigureOut">
               <a:rPr lang="en-US" smtClean="0"/>
-              <a:t>12/15/2014</a:t>
+              <a:t>1/2/2015</a:t>
             </a:fld>
             <a:endParaRPr lang="en-US"/>
           </a:p>
@@ -36796,15 +36796,7 @@
                   <a:schemeClr val="accent4"/>
                 </a:solidFill>
               </a:rPr>
-              <a:t>S</a:t>
-            </a:r>
-            <a:r>
-              <a:rPr lang="en-US" sz="4800" dirty="0" smtClean="0">
-                <a:solidFill>
-                  <a:schemeClr val="accent4"/>
-                </a:solidFill>
-              </a:rPr>
-              <a:t>.O.</a:t>
+              <a:t>S.O.</a:t>
             </a:r>
             <a:r>
               <a:rPr lang="en-US" sz="6600" b="1" dirty="0" smtClean="0">
@@ -36915,7 +36907,12 @@
             <p:ph type="title"/>
           </p:nvPr>
         </p:nvSpPr>
-        <p:spPr/>
+        <p:spPr>
+          <a:xfrm>
+            <a:off x="838200" y="105350"/>
+            <a:ext cx="10515600" cy="1325563"/>
+          </a:xfrm>
+        </p:spPr>
         <p:txBody>
           <a:bodyPr/>
           <a:lstStyle/>
@@ -36938,7 +36935,12 @@
             <p:ph idx="1"/>
           </p:nvPr>
         </p:nvSpPr>
-        <p:spPr/>
+        <p:spPr>
+          <a:xfrm>
+            <a:off x="838200" y="1825625"/>
+            <a:ext cx="9272155" cy="4772602"/>
+          </a:xfrm>
+        </p:spPr>
         <p:txBody>
           <a:bodyPr>
             <a:normAutofit lnSpcReduction="10000"/>
@@ -37054,7 +37056,12 @@
             <p:ph type="title"/>
           </p:nvPr>
         </p:nvSpPr>
-        <p:spPr/>
+        <p:spPr>
+          <a:xfrm>
+            <a:off x="838200" y="105350"/>
+            <a:ext cx="10515600" cy="1325563"/>
+          </a:xfrm>
+        </p:spPr>
         <p:txBody>
           <a:bodyPr/>
           <a:lstStyle/>
@@ -37077,229 +37084,318 @@
             <p:ph idx="1"/>
           </p:nvPr>
         </p:nvSpPr>
-        <p:spPr/>
+        <p:spPr>
+          <a:xfrm>
+            <a:off x="838201" y="1153390"/>
+            <a:ext cx="9147464" cy="5548746"/>
+          </a:xfrm>
+        </p:spPr>
         <p:txBody>
           <a:bodyPr>
-            <a:normAutofit fontScale="32500" lnSpcReduction="20000"/>
+            <a:noAutofit/>
           </a:bodyPr>
           <a:lstStyle/>
           <a:p>
+            <a:pPr>
+              <a:spcBef>
+                <a:spcPts val="600"/>
+              </a:spcBef>
+            </a:pPr>
             <a:r>
-              <a:rPr lang="en-US" dirty="0"/>
+              <a:rPr lang="en-US" sz="1600" dirty="0"/>
               <a:t>Right-click to add aliens to the map, left-click to add standard obstacles</a:t>
             </a:r>
           </a:p>
           <a:p>
+            <a:pPr>
+              <a:spcBef>
+                <a:spcPts val="600"/>
+              </a:spcBef>
+            </a:pPr>
             <a:r>
-              <a:rPr lang="en-US" dirty="0"/>
+              <a:rPr lang="en-US" sz="1600" dirty="0"/>
               <a:t>Rover cannot move through aliens, and aliens cannot move through aliens</a:t>
             </a:r>
           </a:p>
           <a:p>
             <a:pPr lvl="1"/>
             <a:r>
-              <a:rPr lang="en-US" dirty="0"/>
+              <a:rPr lang="en-US" sz="1400" dirty="0"/>
               <a:t>HINT: Aliens are obstacles</a:t>
             </a:r>
           </a:p>
           <a:p>
+            <a:pPr>
+              <a:spcBef>
+                <a:spcPts val="600"/>
+              </a:spcBef>
+            </a:pPr>
             <a:r>
-              <a:rPr lang="en-US" dirty="0"/>
+              <a:rPr lang="en-US" sz="1600" dirty="0"/>
               <a:t>Aliens can be destroyed by missiles and mortars (they are destructible)</a:t>
             </a:r>
           </a:p>
           <a:p>
+            <a:pPr>
+              <a:spcBef>
+                <a:spcPts val="600"/>
+              </a:spcBef>
+            </a:pPr>
             <a:r>
-              <a:rPr lang="en-US" dirty="0"/>
+              <a:rPr lang="en-US" sz="1600" dirty="0"/>
               <a:t>Aliens move on each rover command</a:t>
             </a:r>
           </a:p>
           <a:p>
+            <a:pPr>
+              <a:spcBef>
+                <a:spcPts val="600"/>
+              </a:spcBef>
+            </a:pPr>
             <a:r>
-              <a:rPr lang="en-US" dirty="0"/>
+              <a:rPr lang="en-US" sz="1600" dirty="0"/>
               <a:t>Aliens move in the exact same way as the rover, only randomly</a:t>
             </a:r>
           </a:p>
           <a:p>
             <a:pPr lvl="1"/>
             <a:r>
-              <a:rPr lang="en-US" dirty="0"/>
+              <a:rPr lang="en-US" sz="1400" dirty="0"/>
               <a:t>Forward, Backward, and turning Left or Right</a:t>
             </a:r>
           </a:p>
           <a:p>
-            <a:endParaRPr lang="en-US" sz="1000" dirty="0"/>
+            <a:pPr>
+              <a:spcBef>
+                <a:spcPts val="0"/>
+              </a:spcBef>
+            </a:pPr>
+            <a:endParaRPr lang="en-US" sz="700" dirty="0"/>
           </a:p>
           <a:p>
             <a:pPr marL="0" indent="0">
               <a:buNone/>
             </a:pPr>
             <a:r>
-              <a:rPr lang="en-US" b="1" dirty="0"/>
+              <a:rPr lang="en-US" sz="1600" b="1" dirty="0"/>
               <a:t>Instructions</a:t>
             </a:r>
           </a:p>
           <a:p>
+            <a:pPr marL="514350" indent="-514350">
+              <a:spcBef>
+                <a:spcPts val="600"/>
+              </a:spcBef>
+              <a:buFont typeface="+mj-lt"/>
+              <a:buAutoNum type="arabicPeriod"/>
+            </a:pPr>
             <a:r>
-              <a:rPr lang="en-US" i="1" dirty="0"/>
+              <a:rPr lang="en-US" sz="1600" i="1" dirty="0"/>
               <a:t>Open </a:t>
             </a:r>
             <a:r>
-              <a:rPr lang="en-US" b="1" i="1" dirty="0"/>
+              <a:rPr lang="en-US" sz="1600" b="1" i="1" dirty="0"/>
               <a:t>Solution/MarsCommander.sln</a:t>
             </a:r>
             <a:r>
-              <a:rPr lang="en-US" i="1" dirty="0"/>
+              <a:rPr lang="en-US" sz="1600" i="1" dirty="0"/>
               <a:t> and work in </a:t>
             </a:r>
             <a:r>
-              <a:rPr lang="en-US" b="1" i="1" dirty="0" err="1"/>
+              <a:rPr lang="en-US" sz="1600" b="1" i="1" dirty="0" err="1"/>
               <a:t>MarsRoverKata</a:t>
             </a:r>
             <a:r>
-              <a:rPr lang="en-US" i="1" dirty="0"/>
+              <a:rPr lang="en-US" sz="1600" i="1" dirty="0"/>
               <a:t> project</a:t>
             </a:r>
           </a:p>
           <a:p>
+            <a:pPr marL="514350" indent="-514350">
+              <a:spcBef>
+                <a:spcPts val="600"/>
+              </a:spcBef>
+              <a:buFont typeface="+mj-lt"/>
+              <a:buAutoNum type="arabicPeriod"/>
+            </a:pPr>
             <a:r>
-              <a:rPr lang="en-US" i="1" dirty="0"/>
+              <a:rPr lang="en-US" sz="1600" i="1" dirty="0"/>
               <a:t>Alien implements the newly introduced </a:t>
             </a:r>
             <a:r>
-              <a:rPr lang="en-US" b="1" i="1" dirty="0" err="1"/>
+              <a:rPr lang="en-US" sz="1600" b="1" i="1" dirty="0" err="1"/>
               <a:t>IObstacle</a:t>
             </a:r>
             <a:r>
-              <a:rPr lang="en-US" i="1" dirty="0"/>
+              <a:rPr lang="en-US" sz="1600" i="1" dirty="0"/>
               <a:t> (Done for you to satisfy the compiler).  Implement the members.</a:t>
             </a:r>
           </a:p>
           <a:p>
+            <a:pPr marL="514350" indent="-514350">
+              <a:spcBef>
+                <a:spcPts val="600"/>
+              </a:spcBef>
+              <a:buFont typeface="+mj-lt"/>
+              <a:buAutoNum type="arabicPeriod"/>
+            </a:pPr>
             <a:r>
-              <a:rPr lang="en-US" i="1" dirty="0"/>
+              <a:rPr lang="en-US" sz="1600" i="1" dirty="0"/>
               <a:t>Cut movement related members of </a:t>
             </a:r>
             <a:r>
-              <a:rPr lang="en-US" b="1" i="1" dirty="0"/>
+              <a:rPr lang="en-US" sz="1600" b="1" i="1" dirty="0"/>
               <a:t>Rover</a:t>
             </a:r>
             <a:r>
-              <a:rPr lang="en-US" i="1" dirty="0"/>
+              <a:rPr lang="en-US" sz="1600" i="1" dirty="0"/>
               <a:t> to abstract base type </a:t>
             </a:r>
             <a:r>
-              <a:rPr lang="en-US" b="1" i="1" dirty="0"/>
+              <a:rPr lang="en-US" sz="1600" b="1" i="1" dirty="0"/>
               <a:t>Movable</a:t>
             </a:r>
           </a:p>
           <a:p>
+            <a:pPr marL="514350" indent="-514350">
+              <a:spcBef>
+                <a:spcPts val="600"/>
+              </a:spcBef>
+              <a:buFont typeface="+mj-lt"/>
+              <a:buAutoNum type="arabicPeriod"/>
+            </a:pPr>
             <a:r>
-              <a:rPr lang="en-US" i="1" dirty="0"/>
+              <a:rPr lang="en-US" sz="1600" i="1" dirty="0"/>
               <a:t>Extract </a:t>
             </a:r>
             <a:r>
-              <a:rPr lang="en-US" b="1" i="1" dirty="0" err="1"/>
+              <a:rPr lang="en-US" sz="1600" b="1" i="1" dirty="0" err="1"/>
               <a:t>IMovable</a:t>
             </a:r>
             <a:r>
-              <a:rPr lang="en-US" i="1" dirty="0"/>
+              <a:rPr lang="en-US" sz="1600" i="1" dirty="0"/>
               <a:t> interface from </a:t>
             </a:r>
             <a:r>
-              <a:rPr lang="en-US" b="1" i="1" dirty="0"/>
+              <a:rPr lang="en-US" sz="1600" b="1" i="1" dirty="0"/>
               <a:t>Movable</a:t>
             </a:r>
             <a:r>
-              <a:rPr lang="en-US" i="1" dirty="0"/>
+              <a:rPr lang="en-US" sz="1600" i="1" dirty="0"/>
               <a:t> class</a:t>
             </a:r>
           </a:p>
           <a:p>
+            <a:pPr marL="514350" indent="-514350">
+              <a:spcBef>
+                <a:spcPts val="600"/>
+              </a:spcBef>
+              <a:buFont typeface="+mj-lt"/>
+              <a:buAutoNum type="arabicPeriod"/>
+            </a:pPr>
             <a:r>
-              <a:rPr lang="en-US" i="1" dirty="0"/>
+              <a:rPr lang="en-US" sz="1600" i="1" dirty="0"/>
               <a:t>Make </a:t>
             </a:r>
             <a:r>
-              <a:rPr lang="en-US" b="1" i="1" dirty="0"/>
+              <a:rPr lang="en-US" sz="1600" b="1" i="1" dirty="0"/>
               <a:t>Rover</a:t>
             </a:r>
             <a:r>
-              <a:rPr lang="en-US" i="1" dirty="0"/>
+              <a:rPr lang="en-US" sz="1600" i="1" dirty="0"/>
               <a:t> inherit </a:t>
             </a:r>
             <a:r>
-              <a:rPr lang="en-US" b="1" i="1" dirty="0"/>
+              <a:rPr lang="en-US" sz="1600" b="1" i="1" dirty="0"/>
               <a:t>Movable</a:t>
             </a:r>
           </a:p>
           <a:p>
+            <a:pPr marL="514350" indent="-514350">
+              <a:spcBef>
+                <a:spcPts val="600"/>
+              </a:spcBef>
+              <a:buFont typeface="+mj-lt"/>
+              <a:buAutoNum type="arabicPeriod"/>
+            </a:pPr>
             <a:r>
-              <a:rPr lang="en-US" i="1" dirty="0"/>
+              <a:rPr lang="en-US" sz="1600" i="1" dirty="0"/>
               <a:t>Make </a:t>
             </a:r>
             <a:r>
-              <a:rPr lang="en-US" b="1" i="1" dirty="0"/>
+              <a:rPr lang="en-US" sz="1600" b="1" i="1" dirty="0"/>
               <a:t>Alien</a:t>
             </a:r>
             <a:r>
-              <a:rPr lang="en-US" i="1" dirty="0"/>
+              <a:rPr lang="en-US" sz="1600" i="1" dirty="0"/>
               <a:t> inherit </a:t>
             </a:r>
             <a:r>
-              <a:rPr lang="en-US" b="1" i="1" dirty="0"/>
+              <a:rPr lang="en-US" sz="1600" b="1" i="1" dirty="0"/>
               <a:t>Movable</a:t>
             </a:r>
           </a:p>
           <a:p>
+            <a:pPr marL="514350" indent="-514350">
+              <a:spcBef>
+                <a:spcPts val="600"/>
+              </a:spcBef>
+              <a:buFont typeface="+mj-lt"/>
+              <a:buAutoNum type="arabicPeriod"/>
+            </a:pPr>
             <a:r>
-              <a:rPr lang="en-US" i="1" dirty="0"/>
+              <a:rPr lang="en-US" sz="1600" i="1" dirty="0"/>
               <a:t>Open </a:t>
             </a:r>
             <a:r>
-              <a:rPr lang="en-US" b="1" i="1" dirty="0" err="1"/>
+              <a:rPr lang="en-US" sz="1600" b="1" i="1" dirty="0" err="1"/>
               <a:t>AlienBehavior</a:t>
             </a:r>
             <a:r>
-              <a:rPr lang="en-US" i="1" dirty="0"/>
+              <a:rPr lang="en-US" sz="1600" i="1" dirty="0"/>
               <a:t> and un-comment the code (NOTE: This is the logic that controls alien movement)</a:t>
             </a:r>
           </a:p>
           <a:p>
+            <a:pPr marL="514350" indent="-514350">
+              <a:spcBef>
+                <a:spcPts val="600"/>
+              </a:spcBef>
+              <a:buFont typeface="+mj-lt"/>
+              <a:buAutoNum type="arabicPeriod"/>
+            </a:pPr>
             <a:r>
-              <a:rPr lang="en-US" i="1" dirty="0"/>
+              <a:rPr lang="en-US" sz="1600" i="1" dirty="0"/>
               <a:t>Resolve the build errors</a:t>
             </a:r>
           </a:p>
           <a:p>
-            <a:endParaRPr lang="en-US" sz="1100" i="1" dirty="0"/>
+            <a:endParaRPr lang="en-US" sz="700" i="1" dirty="0"/>
           </a:p>
           <a:p>
+            <a:pPr marL="0" indent="0">
+              <a:buNone/>
+            </a:pPr>
             <a:r>
-              <a:rPr lang="en-US" i="1" dirty="0"/>
+              <a:rPr lang="en-US" sz="1600" i="1" dirty="0"/>
               <a:t>BONUS: How might you prevent </a:t>
             </a:r>
             <a:r>
-              <a:rPr lang="en-US" b="1" i="1" dirty="0"/>
+              <a:rPr lang="en-US" sz="1600" b="1" i="1" dirty="0"/>
               <a:t>Rover</a:t>
             </a:r>
             <a:r>
-              <a:rPr lang="en-US" i="1" dirty="0"/>
-              <a:t> instances from moving into each other?</a:t>
+              <a:rPr lang="en-US" sz="1600" i="1" dirty="0"/>
+              <a:t> instances from moving into each </a:t>
             </a:r>
-          </a:p>
-          <a:p>
-            <a:endParaRPr lang="en-US" sz="1100" i="1" dirty="0"/>
-          </a:p>
-          <a:p>
-            <a:pPr marL="0" indent="0" algn="r">
-              <a:buNone/>
-            </a:pPr>
             <a:r>
-              <a:rPr lang="en-US" i="1" dirty="0"/>
-              <a:t>30 Minutes</a:t>
+              <a:rPr lang="en-US" sz="1600" i="1" dirty="0" smtClean="0"/>
+              <a:t>other?	           30 </a:t>
             </a:r>
-            <a:endParaRPr lang="en-US" i="1" dirty="0"/>
+            <a:r>
+              <a:rPr lang="en-US" sz="1600" i="1" dirty="0"/>
+              <a:t>Minutes</a:t>
+            </a:r>
           </a:p>
         </p:txBody>
       </p:sp>
@@ -37618,7 +37714,7 @@
         </p:blipFill>
         <p:spPr>
           <a:xfrm>
-            <a:off x="517071" y="2526350"/>
+            <a:off x="517071" y="2505568"/>
             <a:ext cx="7942217" cy="1434886"/>
           </a:xfrm>
           <a:prstGeom prst="rect">
@@ -37660,8 +37756,8 @@
         </p:nvSpPr>
         <p:spPr>
           <a:xfrm>
-            <a:off x="6096000" y="4078494"/>
-            <a:ext cx="3628209" cy="2598383"/>
+            <a:off x="5902036" y="4078494"/>
+            <a:ext cx="4187537" cy="2598383"/>
           </a:xfrm>
           <a:prstGeom prst="rect">
             <a:avLst/>
@@ -37669,7 +37765,7 @@
         </p:spPr>
         <p:txBody>
           <a:bodyPr vert="horz" lIns="91440" tIns="45720" rIns="91440" bIns="45720" rtlCol="0">
-            <a:normAutofit fontScale="70000" lnSpcReduction="20000"/>
+            <a:noAutofit/>
           </a:bodyPr>
           <a:lstStyle>
             <a:lvl1pPr marL="228600" indent="-228600" algn="l" defTabSz="914400" rtl="0" eaLnBrk="1" latinLnBrk="0" hangingPunct="1">
@@ -37837,44 +37933,53 @@
           </a:lstStyle>
           <a:p>
             <a:r>
-              <a:rPr lang="en-US" dirty="0" smtClean="0"/>
+              <a:rPr lang="en-US" sz="2400" dirty="0" smtClean="0"/>
               <a:t>LSP:</a:t>
             </a:r>
           </a:p>
           <a:p>
             <a:pPr lvl="1"/>
             <a:r>
-              <a:rPr lang="en-US" dirty="0" smtClean="0"/>
-              <a:t>Aliens are substitutable for Obstacle or Crater</a:t>
+              <a:rPr lang="en-US" sz="1800" dirty="0" smtClean="0"/>
+              <a:t>Aliens are substitutable for Obstacle or </a:t>
+            </a:r>
+            <a:r>
+              <a:rPr lang="en-US" sz="1800" dirty="0" smtClean="0"/>
+              <a:t>Crater</a:t>
             </a:r>
           </a:p>
           <a:p>
-            <a:pPr marL="0" indent="0">
-              <a:buFont typeface="Arial" panose="020B0604020202020204" pitchFamily="34" charset="0"/>
-              <a:buNone/>
+            <a:pPr lvl="1">
+              <a:spcBef>
+                <a:spcPts val="0"/>
+              </a:spcBef>
             </a:pPr>
-            <a:endParaRPr lang="en-US" dirty="0" smtClean="0"/>
+            <a:endParaRPr lang="en-US" sz="1800" dirty="0" smtClean="0"/>
           </a:p>
           <a:p>
             <a:r>
-              <a:rPr lang="en-US" dirty="0" smtClean="0"/>
-              <a:t>ISP:</a:t>
+              <a:rPr lang="en-US" sz="2400" dirty="0" smtClean="0"/>
+              <a:t>ISP</a:t>
+            </a:r>
+            <a:r>
+              <a:rPr lang="en-US" sz="2400" dirty="0" smtClean="0"/>
+              <a:t>:</a:t>
             </a:r>
           </a:p>
           <a:p>
             <a:pPr lvl="1"/>
             <a:r>
-              <a:rPr lang="en-US" dirty="0" smtClean="0"/>
+              <a:rPr lang="en-US" sz="1800" dirty="0" smtClean="0"/>
               <a:t>Obstacle-detection code knows about minimal interface necessary</a:t>
             </a:r>
           </a:p>
           <a:p>
             <a:pPr lvl="1"/>
             <a:r>
-              <a:rPr lang="en-US" dirty="0" smtClean="0"/>
+              <a:rPr lang="en-US" sz="1800" dirty="0" smtClean="0"/>
               <a:t>Any type can “become” an obstacle </a:t>
             </a:r>
-            <a:endParaRPr lang="en-US" dirty="0"/>
+            <a:endParaRPr lang="en-US" sz="1800" dirty="0"/>
           </a:p>
         </p:txBody>
       </p:sp>
@@ -37970,8 +38075,8 @@
         </p:blipFill>
         <p:spPr>
           <a:xfrm>
-            <a:off x="838199" y="1690688"/>
-            <a:ext cx="3880757" cy="2570755"/>
+            <a:off x="438355" y="1397329"/>
+            <a:ext cx="4400267" cy="2914897"/>
           </a:xfrm>
           <a:prstGeom prst="rect">
             <a:avLst/>
@@ -37994,8 +38099,8 @@
         </p:blipFill>
         <p:spPr>
           <a:xfrm>
-            <a:off x="838199" y="4467003"/>
-            <a:ext cx="3876812" cy="670987"/>
+            <a:off x="438355" y="4498174"/>
+            <a:ext cx="4191066" cy="725377"/>
           </a:xfrm>
           <a:prstGeom prst="rect">
             <a:avLst/>
@@ -38018,8 +38123,8 @@
         </p:blipFill>
         <p:spPr>
           <a:xfrm>
-            <a:off x="838199" y="5507998"/>
-            <a:ext cx="5330056" cy="562950"/>
+            <a:off x="438355" y="5409499"/>
+            <a:ext cx="5954116" cy="628862"/>
           </a:xfrm>
           <a:prstGeom prst="rect">
             <a:avLst/>
@@ -38037,7 +38142,7 @@
         <p:spPr>
           <a:xfrm>
             <a:off x="4901480" y="1551708"/>
-            <a:ext cx="5551340" cy="4960891"/>
+            <a:ext cx="5198484" cy="4960891"/>
           </a:xfrm>
           <a:prstGeom prst="rect">
             <a:avLst/>
@@ -38335,7 +38440,11 @@
             </a:r>
             <a:r>
               <a:rPr lang="en-US" dirty="0" smtClean="0"/>
-              <a:t> Substitution</a:t>
+              <a:t> </a:t>
+            </a:r>
+            <a:r>
+              <a:rPr lang="en-US" dirty="0" smtClean="0"/>
+              <a:t>Substitution?</a:t>
             </a:r>
             <a:endParaRPr lang="en-US" dirty="0"/>
           </a:p>
@@ -38351,7 +38460,12 @@
             <p:ph idx="1"/>
           </p:nvPr>
         </p:nvSpPr>
-        <p:spPr/>
+        <p:spPr>
+          <a:xfrm>
+            <a:off x="838200" y="1825625"/>
+            <a:ext cx="9116291" cy="4351338"/>
+          </a:xfrm>
+        </p:spPr>
         <p:txBody>
           <a:bodyPr/>
           <a:lstStyle/>
@@ -38374,19 +38488,18 @@
           </a:p>
           <a:p>
             <a:r>
-              <a:rPr lang="en-US" dirty="0"/>
+              <a:rPr lang="en-US" i="1" dirty="0"/>
               <a:t>Strong behavioral subtyping</a:t>
             </a:r>
           </a:p>
           <a:p>
-            <a:endParaRPr lang="en-US" dirty="0"/>
+            <a:endParaRPr lang="en-US" i="1" dirty="0"/>
           </a:p>
           <a:p>
             <a:r>
-              <a:rPr lang="en-US" dirty="0"/>
+              <a:rPr lang="en-US" i="1" dirty="0"/>
               <a:t>Semantic as well as syntactic</a:t>
             </a:r>
-            <a:endParaRPr lang="en-US" dirty="0"/>
           </a:p>
         </p:txBody>
       </p:sp>
@@ -38725,7 +38838,15 @@
           <a:p>
             <a:r>
               <a:rPr lang="en-US" dirty="0" smtClean="0"/>
-              <a:t>Real-World Example</a:t>
+              <a:t>LOB Application</a:t>
+            </a:r>
+            <a:r>
+              <a:rPr lang="en-US" dirty="0" smtClean="0"/>
+              <a:t> </a:t>
+            </a:r>
+            <a:r>
+              <a:rPr lang="en-US" dirty="0" smtClean="0"/>
+              <a:t>Example</a:t>
             </a:r>
             <a:endParaRPr lang="en-US" dirty="0"/>
           </a:p>
@@ -39052,7 +39173,11 @@
           <a:p>
             <a:r>
               <a:rPr lang="en-US" dirty="0" smtClean="0"/>
-              <a:t>Real-World Example Revisited</a:t>
+              <a:t>LOB Application Example </a:t>
+            </a:r>
+            <a:r>
+              <a:rPr lang="en-US" dirty="0" smtClean="0"/>
+              <a:t>Revisited</a:t>
             </a:r>
             <a:endParaRPr lang="en-US" dirty="0"/>
           </a:p>
@@ -39068,7 +39193,7 @@
             <p:ph idx="1"/>
             <p:extLst>
               <p:ext uri="{D42A27DB-BD31-4B8C-83A1-F6EECF244321}">
-                <p14:modId xmlns:p14="http://schemas.microsoft.com/office/powerpoint/2010/main" val="3718046169"/>
+                <p14:modId xmlns:p14="http://schemas.microsoft.com/office/powerpoint/2010/main" val="408376802"/>
               </p:ext>
             </p:extLst>
           </p:nvPr>
@@ -39099,8 +39224,8 @@
         </p:blipFill>
         <p:spPr>
           <a:xfrm>
-            <a:off x="202475" y="1902959"/>
-            <a:ext cx="6263640" cy="1057650"/>
+            <a:off x="347948" y="1736703"/>
+            <a:ext cx="7129908" cy="1203924"/>
           </a:xfrm>
           <a:prstGeom prst="rect">
             <a:avLst/>
@@ -39291,7 +39416,11 @@
           <a:p>
             <a:r>
               <a:rPr lang="en-US" dirty="0" smtClean="0"/>
-              <a:t>What is Interface Segregation</a:t>
+              <a:t>What is Interface </a:t>
+            </a:r>
+            <a:r>
+              <a:rPr lang="en-US" dirty="0" smtClean="0"/>
+              <a:t>Segregation?</a:t>
             </a:r>
             <a:endParaRPr lang="en-US" dirty="0"/>
           </a:p>
@@ -39307,14 +39436,27 @@
             <p:ph idx="1"/>
           </p:nvPr>
         </p:nvSpPr>
-        <p:spPr/>
+        <p:spPr>
+          <a:xfrm>
+            <a:off x="838200" y="1825625"/>
+            <a:ext cx="9303327" cy="4351338"/>
+          </a:xfrm>
+        </p:spPr>
         <p:txBody>
           <a:bodyPr/>
           <a:lstStyle/>
           <a:p>
             <a:r>
               <a:rPr lang="en-US" dirty="0"/>
-              <a:t>Wikipedia: no client should be forced to depend on methods it does not use. ISP splits interfaces which are very large into smaller and more specific ones so that clients will only have to know about the methods that are of interest to them.</a:t>
+              <a:t>Wikipedia: no client should be forced to depend on methods </a:t>
+            </a:r>
+            <a:r>
+              <a:rPr lang="en-US" dirty="0" smtClean="0"/>
+              <a:t>it </a:t>
+            </a:r>
+            <a:r>
+              <a:rPr lang="en-US" dirty="0"/>
+              <a:t>does not use. ISP splits interfaces which are very large into smaller and more specific ones so that clients will only have to know about the methods that are of interest to them.</a:t>
             </a:r>
           </a:p>
           <a:p>
@@ -39322,19 +39464,18 @@
           </a:p>
           <a:p>
             <a:r>
-              <a:rPr lang="en-US" dirty="0"/>
+              <a:rPr lang="en-US" i="1" dirty="0"/>
               <a:t>Role interfaces</a:t>
             </a:r>
           </a:p>
           <a:p>
-            <a:endParaRPr lang="en-US" dirty="0"/>
+            <a:endParaRPr lang="en-US" i="1" dirty="0"/>
           </a:p>
           <a:p>
             <a:r>
-              <a:rPr lang="en-US" dirty="0"/>
+              <a:rPr lang="en-US" i="1" dirty="0"/>
               <a:t>Encourages more broadly applicable interfaces</a:t>
             </a:r>
-            <a:endParaRPr lang="en-US" dirty="0"/>
           </a:p>
         </p:txBody>
       </p:sp>
@@ -39807,7 +39948,6 @@
               <a:rPr lang="en-US" dirty="0"/>
               <a:t>Avoid overly “fat” interfaces</a:t>
             </a:r>
-            <a:endParaRPr lang="en-US" dirty="0"/>
           </a:p>
         </p:txBody>
       </p:sp>

</xml_diff>

<commit_message>
More tweaking of presentation slides.
</commit_message>
<xml_diff>
--- a/Presentations/LI Redux.pptx
+++ b/Presentations/LI Redux.pptx
@@ -8572,7 +8572,7 @@
         <a:p>
           <a:r>
             <a:rPr lang="en-US" sz="2000" dirty="0" smtClean="0"/>
-            <a:t>Minnow</a:t>
+            <a:t>Trout</a:t>
           </a:r>
           <a:endParaRPr lang="en-US" sz="2000" dirty="0"/>
         </a:p>
@@ -9367,7 +9367,7 @@
   <dgm:whole/>
   <dgm:extLst>
     <a:ext uri="http://schemas.microsoft.com/office/drawing/2008/diagram">
-      <dsp:dataModelExt xmlns:dsp="http://schemas.microsoft.com/office/drawing/2008/diagram" relId="rId7" minVer="http://schemas.openxmlformats.org/drawingml/2006/diagram"/>
+      <dsp:dataModelExt xmlns:dsp="http://schemas.microsoft.com/office/drawing/2008/diagram" relId="rId8" minVer="http://schemas.openxmlformats.org/drawingml/2006/diagram"/>
     </a:ext>
   </dgm:extLst>
 </dgm:dataModel>
@@ -13311,8 +13311,8 @@
       </dsp:nvSpPr>
       <dsp:spPr>
         <a:xfrm>
-          <a:off x="7695751" y="1970530"/>
-          <a:ext cx="1325012" cy="338741"/>
+          <a:off x="8722358" y="2351152"/>
+          <a:ext cx="1501767" cy="383928"/>
         </a:xfrm>
         <a:custGeom>
           <a:avLst/>
@@ -13326,13 +13326,13 @@
                 <a:pt x="0" y="0"/>
               </a:moveTo>
               <a:lnTo>
-                <a:pt x="0" y="205138"/>
+                <a:pt x="0" y="232503"/>
               </a:lnTo>
               <a:lnTo>
-                <a:pt x="1325012" y="205138"/>
+                <a:pt x="1501767" y="232503"/>
               </a:lnTo>
               <a:lnTo>
-                <a:pt x="1325012" y="338741"/>
+                <a:pt x="1501767" y="383928"/>
               </a:lnTo>
             </a:path>
           </a:pathLst>
@@ -13373,8 +13373,8 @@
       </dsp:nvSpPr>
       <dsp:spPr>
         <a:xfrm>
-          <a:off x="7481146" y="1970530"/>
-          <a:ext cx="214604" cy="338741"/>
+          <a:off x="8479125" y="2351152"/>
+          <a:ext cx="243232" cy="383928"/>
         </a:xfrm>
         <a:custGeom>
           <a:avLst/>
@@ -13385,16 +13385,16 @@
           <a:pathLst>
             <a:path>
               <a:moveTo>
-                <a:pt x="214604" y="0"/>
+                <a:pt x="243232" y="0"/>
               </a:moveTo>
               <a:lnTo>
-                <a:pt x="214604" y="205138"/>
+                <a:pt x="243232" y="232503"/>
               </a:lnTo>
               <a:lnTo>
-                <a:pt x="0" y="205138"/>
+                <a:pt x="0" y="232503"/>
               </a:lnTo>
               <a:lnTo>
-                <a:pt x="0" y="338741"/>
+                <a:pt x="0" y="383928"/>
               </a:lnTo>
             </a:path>
           </a:pathLst>
@@ -13435,8 +13435,8 @@
       </dsp:nvSpPr>
       <dsp:spPr>
         <a:xfrm>
-          <a:off x="5941529" y="1970530"/>
-          <a:ext cx="1754221" cy="338741"/>
+          <a:off x="6734124" y="2351152"/>
+          <a:ext cx="1988233" cy="383928"/>
         </a:xfrm>
         <a:custGeom>
           <a:avLst/>
@@ -13447,16 +13447,16 @@
           <a:pathLst>
             <a:path>
               <a:moveTo>
-                <a:pt x="1754221" y="0"/>
+                <a:pt x="1988233" y="0"/>
               </a:moveTo>
               <a:lnTo>
-                <a:pt x="1754221" y="205138"/>
+                <a:pt x="1988233" y="232503"/>
               </a:lnTo>
               <a:lnTo>
-                <a:pt x="0" y="205138"/>
+                <a:pt x="0" y="232503"/>
               </a:lnTo>
               <a:lnTo>
-                <a:pt x="0" y="338741"/>
+                <a:pt x="0" y="383928"/>
               </a:lnTo>
             </a:path>
           </a:pathLst>
@@ -13497,8 +13497,8 @@
       </dsp:nvSpPr>
       <dsp:spPr>
         <a:xfrm>
-          <a:off x="2540388" y="1982453"/>
-          <a:ext cx="1861524" cy="326818"/>
+          <a:off x="2879274" y="2364665"/>
+          <a:ext cx="2109849" cy="370416"/>
         </a:xfrm>
         <a:custGeom>
           <a:avLst/>
@@ -13512,13 +13512,13 @@
                 <a:pt x="0" y="0"/>
               </a:moveTo>
               <a:lnTo>
-                <a:pt x="0" y="193215"/>
+                <a:pt x="0" y="218990"/>
               </a:lnTo>
               <a:lnTo>
-                <a:pt x="1861524" y="193215"/>
+                <a:pt x="2109849" y="218990"/>
               </a:lnTo>
               <a:lnTo>
-                <a:pt x="1861524" y="326818"/>
+                <a:pt x="2109849" y="370416"/>
               </a:lnTo>
             </a:path>
           </a:pathLst>
@@ -13559,8 +13559,8 @@
       </dsp:nvSpPr>
       <dsp:spPr>
         <a:xfrm>
-          <a:off x="2540388" y="1982453"/>
-          <a:ext cx="321907" cy="326818"/>
+          <a:off x="2879274" y="2364665"/>
+          <a:ext cx="364849" cy="370416"/>
         </a:xfrm>
         <a:custGeom>
           <a:avLst/>
@@ -13574,13 +13574,13 @@
                 <a:pt x="0" y="0"/>
               </a:moveTo>
               <a:lnTo>
-                <a:pt x="0" y="193215"/>
+                <a:pt x="0" y="218990"/>
               </a:lnTo>
               <a:lnTo>
-                <a:pt x="321907" y="193215"/>
+                <a:pt x="364849" y="218990"/>
               </a:lnTo>
               <a:lnTo>
-                <a:pt x="321907" y="326818"/>
+                <a:pt x="364849" y="370416"/>
               </a:lnTo>
             </a:path>
           </a:pathLst>
@@ -13621,8 +13621,8 @@
       </dsp:nvSpPr>
       <dsp:spPr>
         <a:xfrm>
-          <a:off x="1322679" y="1982453"/>
-          <a:ext cx="1217709" cy="326818"/>
+          <a:off x="1499123" y="2364665"/>
+          <a:ext cx="1380151" cy="370416"/>
         </a:xfrm>
         <a:custGeom>
           <a:avLst/>
@@ -13633,16 +13633,16 @@
           <a:pathLst>
             <a:path>
               <a:moveTo>
-                <a:pt x="1217709" y="0"/>
+                <a:pt x="1380151" y="0"/>
               </a:moveTo>
               <a:lnTo>
-                <a:pt x="1217709" y="193215"/>
+                <a:pt x="1380151" y="218990"/>
               </a:lnTo>
               <a:lnTo>
-                <a:pt x="0" y="193215"/>
+                <a:pt x="0" y="218990"/>
               </a:lnTo>
               <a:lnTo>
-                <a:pt x="0" y="326818"/>
+                <a:pt x="0" y="370416"/>
               </a:lnTo>
             </a:path>
           </a:pathLst>
@@ -13683,8 +13683,8 @@
       </dsp:nvSpPr>
       <dsp:spPr>
         <a:xfrm>
-          <a:off x="3983938" y="441048"/>
-          <a:ext cx="1272410" cy="636205"/>
+          <a:off x="4515392" y="617638"/>
+          <a:ext cx="1442149" cy="721074"/>
         </a:xfrm>
         <a:prstGeom prst="rect">
           <a:avLst/>
@@ -13726,12 +13726,12 @@
         </a:fontRef>
       </dsp:style>
       <dsp:txBody>
-        <a:bodyPr spcFirstLastPara="0" vert="horz" wrap="square" lIns="12065" tIns="12065" rIns="12065" bIns="12065" numCol="1" spcCol="1270" anchor="ctr" anchorCtr="0">
+        <a:bodyPr spcFirstLastPara="0" vert="horz" wrap="square" lIns="13970" tIns="13970" rIns="13970" bIns="13970" numCol="1" spcCol="1270" anchor="ctr" anchorCtr="0">
           <a:noAutofit/>
         </a:bodyPr>
         <a:lstStyle/>
         <a:p>
-          <a:pPr lvl="0" algn="ctr" defTabSz="844550">
+          <a:pPr lvl="0" algn="ctr" defTabSz="977900">
             <a:lnSpc>
               <a:spcPct val="90000"/>
             </a:lnSpc>
@@ -13743,15 +13743,15 @@
             </a:spcAft>
           </a:pPr>
           <a:r>
-            <a:rPr lang="en-US" sz="1900" kern="1200" dirty="0" err="1" smtClean="0"/>
+            <a:rPr lang="en-US" sz="2200" kern="1200" dirty="0" err="1" smtClean="0"/>
             <a:t>ISwimmable</a:t>
           </a:r>
-          <a:endParaRPr lang="en-US" sz="1900" kern="1200" dirty="0"/>
+          <a:endParaRPr lang="en-US" sz="2200" kern="1200" dirty="0"/>
         </a:p>
       </dsp:txBody>
       <dsp:txXfrm>
-        <a:off x="3983938" y="441048"/>
-        <a:ext cx="1272410" cy="636205"/>
+        <a:off x="4515392" y="617638"/>
+        <a:ext cx="1442149" cy="721074"/>
       </dsp:txXfrm>
     </dsp:sp>
     <dsp:sp modelId="{AD2D83D9-2691-4D81-AA79-2E6CE7131040}">
@@ -13761,8 +13761,8 @@
       </dsp:nvSpPr>
       <dsp:spPr>
         <a:xfrm>
-          <a:off x="5474860" y="442594"/>
-          <a:ext cx="1272410" cy="636205"/>
+          <a:off x="6205202" y="619391"/>
+          <a:ext cx="1442149" cy="721074"/>
         </a:xfrm>
         <a:prstGeom prst="rect">
           <a:avLst/>
@@ -13804,12 +13804,12 @@
         </a:fontRef>
       </dsp:style>
       <dsp:txBody>
-        <a:bodyPr spcFirstLastPara="0" vert="horz" wrap="square" lIns="12065" tIns="12065" rIns="12065" bIns="12065" numCol="1" spcCol="1270" anchor="ctr" anchorCtr="0">
+        <a:bodyPr spcFirstLastPara="0" vert="horz" wrap="square" lIns="13970" tIns="13970" rIns="13970" bIns="13970" numCol="1" spcCol="1270" anchor="ctr" anchorCtr="0">
           <a:noAutofit/>
         </a:bodyPr>
         <a:lstStyle/>
         <a:p>
-          <a:pPr lvl="0" algn="ctr" defTabSz="844550">
+          <a:pPr lvl="0" algn="ctr" defTabSz="977900">
             <a:lnSpc>
               <a:spcPct val="90000"/>
             </a:lnSpc>
@@ -13821,15 +13821,15 @@
             </a:spcAft>
           </a:pPr>
           <a:r>
-            <a:rPr lang="en-US" sz="1900" kern="1200" dirty="0" err="1" smtClean="0"/>
+            <a:rPr lang="en-US" sz="2200" kern="1200" dirty="0" err="1" smtClean="0"/>
             <a:t>IFlyable</a:t>
           </a:r>
-          <a:endParaRPr lang="en-US" sz="1900" kern="1200" dirty="0"/>
+          <a:endParaRPr lang="en-US" sz="2200" kern="1200" dirty="0"/>
         </a:p>
       </dsp:txBody>
       <dsp:txXfrm>
-        <a:off x="5474860" y="442594"/>
-        <a:ext cx="1272410" cy="636205"/>
+        <a:off x="6205202" y="619391"/>
+        <a:ext cx="1442149" cy="721074"/>
       </dsp:txXfrm>
     </dsp:sp>
     <dsp:sp modelId="{1D150035-E173-4748-8FEC-ABFE9DEF9CFE}">
@@ -13839,8 +13839,8 @@
       </dsp:nvSpPr>
       <dsp:spPr>
         <a:xfrm>
-          <a:off x="1904183" y="1346248"/>
-          <a:ext cx="1272410" cy="636205"/>
+          <a:off x="2158199" y="1643591"/>
+          <a:ext cx="1442149" cy="721074"/>
         </a:xfrm>
         <a:prstGeom prst="rect">
           <a:avLst/>
@@ -13906,8 +13906,8 @@
         </a:p>
       </dsp:txBody>
       <dsp:txXfrm>
-        <a:off x="1904183" y="1346248"/>
-        <a:ext cx="1272410" cy="636205"/>
+        <a:off x="2158199" y="1643591"/>
+        <a:ext cx="1442149" cy="721074"/>
       </dsp:txXfrm>
     </dsp:sp>
     <dsp:sp modelId="{88794A25-05F9-44A2-A316-1135F919E561}">
@@ -13917,8 +13917,8 @@
       </dsp:nvSpPr>
       <dsp:spPr>
         <a:xfrm>
-          <a:off x="686473" y="2309272"/>
-          <a:ext cx="1272410" cy="636205"/>
+          <a:off x="778048" y="2735081"/>
+          <a:ext cx="1442149" cy="721074"/>
         </a:xfrm>
         <a:prstGeom prst="rect">
           <a:avLst/>
@@ -13984,8 +13984,8 @@
         </a:p>
       </dsp:txBody>
       <dsp:txXfrm>
-        <a:off x="686473" y="2309272"/>
-        <a:ext cx="1272410" cy="636205"/>
+        <a:off x="778048" y="2735081"/>
+        <a:ext cx="1442149" cy="721074"/>
       </dsp:txXfrm>
     </dsp:sp>
     <dsp:sp modelId="{7496D61A-A998-4BF2-8370-9CBF83AEF6D1}">
@@ -13995,8 +13995,8 @@
       </dsp:nvSpPr>
       <dsp:spPr>
         <a:xfrm>
-          <a:off x="2226090" y="2309272"/>
-          <a:ext cx="1272410" cy="636205"/>
+          <a:off x="2523049" y="2735081"/>
+          <a:ext cx="1442149" cy="721074"/>
         </a:xfrm>
         <a:prstGeom prst="rect">
           <a:avLst/>
@@ -14062,8 +14062,8 @@
         </a:p>
       </dsp:txBody>
       <dsp:txXfrm>
-        <a:off x="2226090" y="2309272"/>
-        <a:ext cx="1272410" cy="636205"/>
+        <a:off x="2523049" y="2735081"/>
+        <a:ext cx="1442149" cy="721074"/>
       </dsp:txXfrm>
     </dsp:sp>
     <dsp:sp modelId="{14CFEA48-16E6-4915-BD01-B48FD64B94A8}">
@@ -14073,8 +14073,8 @@
       </dsp:nvSpPr>
       <dsp:spPr>
         <a:xfrm>
-          <a:off x="3765707" y="2309272"/>
-          <a:ext cx="1272410" cy="636205"/>
+          <a:off x="4268049" y="2735081"/>
+          <a:ext cx="1442149" cy="721074"/>
         </a:xfrm>
         <a:prstGeom prst="rect">
           <a:avLst/>
@@ -14140,8 +14140,8 @@
         </a:p>
       </dsp:txBody>
       <dsp:txXfrm>
-        <a:off x="3765707" y="2309272"/>
-        <a:ext cx="1272410" cy="636205"/>
+        <a:off x="4268049" y="2735081"/>
+        <a:ext cx="1442149" cy="721074"/>
       </dsp:txXfrm>
     </dsp:sp>
     <dsp:sp modelId="{8D826DCB-CBA5-4228-9CBC-4B79B0B74322}">
@@ -14151,8 +14151,8 @@
       </dsp:nvSpPr>
       <dsp:spPr>
         <a:xfrm>
-          <a:off x="7059546" y="1334325"/>
-          <a:ext cx="1272410" cy="636205"/>
+          <a:off x="8001283" y="1630078"/>
+          <a:ext cx="1442149" cy="721074"/>
         </a:xfrm>
         <a:prstGeom prst="rect">
           <a:avLst/>
@@ -14218,8 +14218,8 @@
         </a:p>
       </dsp:txBody>
       <dsp:txXfrm>
-        <a:off x="7059546" y="1334325"/>
-        <a:ext cx="1272410" cy="636205"/>
+        <a:off x="8001283" y="1630078"/>
+        <a:ext cx="1442149" cy="721074"/>
       </dsp:txXfrm>
     </dsp:sp>
     <dsp:sp modelId="{71A91E46-0E7A-473B-A611-D0CF6B495DE5}">
@@ -14229,8 +14229,8 @@
       </dsp:nvSpPr>
       <dsp:spPr>
         <a:xfrm>
-          <a:off x="5305324" y="2309272"/>
-          <a:ext cx="1272410" cy="636205"/>
+          <a:off x="6013050" y="2735081"/>
+          <a:ext cx="1442149" cy="721074"/>
         </a:xfrm>
         <a:prstGeom prst="rect">
           <a:avLst/>
@@ -14296,8 +14296,8 @@
         </a:p>
       </dsp:txBody>
       <dsp:txXfrm>
-        <a:off x="5305324" y="2309272"/>
-        <a:ext cx="1272410" cy="636205"/>
+        <a:off x="6013050" y="2735081"/>
+        <a:ext cx="1442149" cy="721074"/>
       </dsp:txXfrm>
     </dsp:sp>
     <dsp:sp modelId="{89752FAE-DDC6-4BA6-B63A-2BC24C5292D3}">
@@ -14307,8 +14307,8 @@
       </dsp:nvSpPr>
       <dsp:spPr>
         <a:xfrm>
-          <a:off x="6844941" y="2309272"/>
-          <a:ext cx="1272410" cy="636205"/>
+          <a:off x="7758050" y="2735081"/>
+          <a:ext cx="1442149" cy="721074"/>
         </a:xfrm>
         <a:prstGeom prst="rect">
           <a:avLst/>
@@ -14368,14 +14368,14 @@
           </a:pPr>
           <a:r>
             <a:rPr lang="en-US" sz="2000" kern="1200" dirty="0" smtClean="0"/>
-            <a:t>Minnow</a:t>
+            <a:t>Trout</a:t>
           </a:r>
           <a:endParaRPr lang="en-US" sz="2000" kern="1200" dirty="0"/>
         </a:p>
       </dsp:txBody>
       <dsp:txXfrm>
-        <a:off x="6844941" y="2309272"/>
-        <a:ext cx="1272410" cy="636205"/>
+        <a:off x="7758050" y="2735081"/>
+        <a:ext cx="1442149" cy="721074"/>
       </dsp:txXfrm>
     </dsp:sp>
     <dsp:sp modelId="{DBF797E2-5946-4EB3-B2E4-5100A83E0855}">
@@ -14385,8 +14385,8 @@
       </dsp:nvSpPr>
       <dsp:spPr>
         <a:xfrm>
-          <a:off x="8384558" y="2309272"/>
-          <a:ext cx="1272410" cy="636205"/>
+          <a:off x="9503051" y="2735081"/>
+          <a:ext cx="1442149" cy="721074"/>
         </a:xfrm>
         <a:prstGeom prst="rect">
           <a:avLst/>
@@ -14452,8 +14452,8 @@
         </a:p>
       </dsp:txBody>
       <dsp:txXfrm>
-        <a:off x="8384558" y="2309272"/>
-        <a:ext cx="1272410" cy="636205"/>
+        <a:off x="9503051" y="2735081"/>
+        <a:ext cx="1442149" cy="721074"/>
       </dsp:txXfrm>
     </dsp:sp>
   </dsp:spTree>
@@ -33804,6 +33804,151 @@
           <a:bodyPr/>
           <a:lstStyle/>
           <a:p>
+            <a:pPr marL="0" marR="0" indent="0" algn="l" defTabSz="914400" rtl="0" eaLnBrk="1" fontAlgn="auto" latinLnBrk="0" hangingPunct="1">
+              <a:lnSpc>
+                <a:spcPct val="100000"/>
+              </a:lnSpc>
+              <a:spcBef>
+                <a:spcPts val="0"/>
+              </a:spcBef>
+              <a:spcAft>
+                <a:spcPts val="0"/>
+              </a:spcAft>
+              <a:buClrTx/>
+              <a:buSzTx/>
+              <a:buFontTx/>
+              <a:buNone/>
+              <a:tabLst/>
+              <a:defRPr/>
+            </a:pPr>
+            <a:r>
+              <a:rPr lang="en-US" dirty="0" smtClean="0"/>
+              <a:t>Can pretty much ignore the long definition</a:t>
+            </a:r>
+          </a:p>
+          <a:p>
+            <a:endParaRPr lang="en-US" dirty="0"/>
+          </a:p>
+        </p:txBody>
+      </p:sp>
+      <p:sp>
+        <p:nvSpPr>
+          <p:cNvPr id="4" name="Slide Number Placeholder 3"/>
+          <p:cNvSpPr>
+            <a:spLocks noGrp="1"/>
+          </p:cNvSpPr>
+          <p:nvPr>
+            <p:ph type="sldNum" sz="quarter" idx="10"/>
+          </p:nvPr>
+        </p:nvSpPr>
+        <p:spPr/>
+        <p:txBody>
+          <a:bodyPr/>
+          <a:lstStyle/>
+          <a:p>
+            <a:fld id="{5E646BB7-50E9-43CE-B8D8-A01580F287EB}" type="slidenum">
+              <a:rPr lang="en-US" smtClean="0"/>
+              <a:t>2</a:t>
+            </a:fld>
+            <a:endParaRPr lang="en-US"/>
+          </a:p>
+        </p:txBody>
+      </p:sp>
+    </p:spTree>
+    <p:extLst>
+      <p:ext uri="{BB962C8B-B14F-4D97-AF65-F5344CB8AC3E}">
+        <p14:creationId xmlns:p14="http://schemas.microsoft.com/office/powerpoint/2010/main" val="614797265"/>
+      </p:ext>
+    </p:extLst>
+  </p:cSld>
+  <p:clrMapOvr>
+    <a:masterClrMapping/>
+  </p:clrMapOvr>
+</p:notes>
+</file>
+
+<file path=ppt/notesSlides/notesSlide3.xml><?xml version="1.0" encoding="utf-8"?>
+<p:notes xmlns:a="http://schemas.openxmlformats.org/drawingml/2006/main" xmlns:r="http://schemas.openxmlformats.org/officeDocument/2006/relationships" xmlns:p="http://schemas.openxmlformats.org/presentationml/2006/main">
+  <p:cSld>
+    <p:spTree>
+      <p:nvGrpSpPr>
+        <p:cNvPr id="1" name=""/>
+        <p:cNvGrpSpPr/>
+        <p:nvPr/>
+      </p:nvGrpSpPr>
+      <p:grpSpPr>
+        <a:xfrm>
+          <a:off x="0" y="0"/>
+          <a:ext cx="0" cy="0"/>
+          <a:chOff x="0" y="0"/>
+          <a:chExt cx="0" cy="0"/>
+        </a:xfrm>
+      </p:grpSpPr>
+      <p:sp>
+        <p:nvSpPr>
+          <p:cNvPr id="2" name="Slide Image Placeholder 1"/>
+          <p:cNvSpPr>
+            <a:spLocks noGrp="1" noRot="1" noChangeAspect="1"/>
+          </p:cNvSpPr>
+          <p:nvPr>
+            <p:ph type="sldImg"/>
+          </p:nvPr>
+        </p:nvSpPr>
+        <p:spPr/>
+      </p:sp>
+      <p:sp>
+        <p:nvSpPr>
+          <p:cNvPr id="3" name="Notes Placeholder 2"/>
+          <p:cNvSpPr>
+            <a:spLocks noGrp="1"/>
+          </p:cNvSpPr>
+          <p:nvPr>
+            <p:ph type="body" idx="1"/>
+          </p:nvPr>
+        </p:nvSpPr>
+        <p:spPr/>
+        <p:txBody>
+          <a:bodyPr/>
+          <a:lstStyle/>
+          <a:p>
+            <a:r>
+              <a:rPr lang="en-US" dirty="0" smtClean="0"/>
+              <a:t>-Ostrich and Penguin can’t fly</a:t>
+            </a:r>
+          </a:p>
+          <a:p>
+            <a:r>
+              <a:rPr lang="en-US" dirty="0" smtClean="0"/>
+              <a:t>-</a:t>
+            </a:r>
+            <a:r>
+              <a:rPr lang="en-US" dirty="0" err="1" smtClean="0"/>
+              <a:t>FlyingFish</a:t>
+            </a:r>
+            <a:r>
+              <a:rPr lang="en-US" baseline="0" dirty="0" smtClean="0"/>
+              <a:t> also flies</a:t>
+            </a:r>
+          </a:p>
+          <a:p>
+            <a:r>
+              <a:rPr lang="en-US" baseline="0" dirty="0" smtClean="0"/>
+              <a:t>-</a:t>
+            </a:r>
+            <a:r>
+              <a:rPr lang="en-US" baseline="0" dirty="0" err="1" smtClean="0"/>
+              <a:t>StarFish</a:t>
+            </a:r>
+            <a:r>
+              <a:rPr lang="en-US" baseline="0" dirty="0" smtClean="0"/>
+              <a:t> doesn’t swim (ignore that it is not a fish!)</a:t>
+            </a:r>
+          </a:p>
+          <a:p>
+            <a:r>
+              <a:rPr lang="en-US" baseline="0" smtClean="0"/>
+              <a:t>-Penguin </a:t>
+            </a:r>
             <a:endParaRPr lang="en-US" dirty="0"/>
           </a:p>
         </p:txBody>
@@ -33835,6 +33980,130 @@
     <p:extLst>
       <p:ext uri="{BB962C8B-B14F-4D97-AF65-F5344CB8AC3E}">
         <p14:creationId xmlns:p14="http://schemas.microsoft.com/office/powerpoint/2010/main" val="2737196556"/>
+      </p:ext>
+    </p:extLst>
+  </p:cSld>
+  <p:clrMapOvr>
+    <a:masterClrMapping/>
+  </p:clrMapOvr>
+</p:notes>
+</file>
+
+<file path=ppt/notesSlides/notesSlide4.xml><?xml version="1.0" encoding="utf-8"?>
+<p:notes xmlns:a="http://schemas.openxmlformats.org/drawingml/2006/main" xmlns:r="http://schemas.openxmlformats.org/officeDocument/2006/relationships" xmlns:p="http://schemas.openxmlformats.org/presentationml/2006/main">
+  <p:cSld>
+    <p:spTree>
+      <p:nvGrpSpPr>
+        <p:cNvPr id="1" name=""/>
+        <p:cNvGrpSpPr/>
+        <p:nvPr/>
+      </p:nvGrpSpPr>
+      <p:grpSpPr>
+        <a:xfrm>
+          <a:off x="0" y="0"/>
+          <a:ext cx="0" cy="0"/>
+          <a:chOff x="0" y="0"/>
+          <a:chExt cx="0" cy="0"/>
+        </a:xfrm>
+      </p:grpSpPr>
+      <p:sp>
+        <p:nvSpPr>
+          <p:cNvPr id="2" name="Slide Image Placeholder 1"/>
+          <p:cNvSpPr>
+            <a:spLocks noGrp="1" noRot="1" noChangeAspect="1"/>
+          </p:cNvSpPr>
+          <p:nvPr>
+            <p:ph type="sldImg"/>
+          </p:nvPr>
+        </p:nvSpPr>
+        <p:spPr/>
+      </p:sp>
+      <p:sp>
+        <p:nvSpPr>
+          <p:cNvPr id="3" name="Notes Placeholder 2"/>
+          <p:cNvSpPr>
+            <a:spLocks noGrp="1"/>
+          </p:cNvSpPr>
+          <p:nvPr>
+            <p:ph type="body" idx="1"/>
+          </p:nvPr>
+        </p:nvSpPr>
+        <p:spPr/>
+        <p:txBody>
+          <a:bodyPr/>
+          <a:lstStyle/>
+          <a:p>
+            <a:r>
+              <a:rPr lang="en-US" dirty="0" smtClean="0"/>
+              <a:t>Now, code that controls flight is only concerned about members</a:t>
+            </a:r>
+            <a:r>
+              <a:rPr lang="en-US" baseline="0" dirty="0" smtClean="0"/>
+              <a:t> related to flight.</a:t>
+            </a:r>
+          </a:p>
+          <a:p>
+            <a:r>
+              <a:rPr lang="en-US" baseline="0" dirty="0" smtClean="0"/>
+              <a:t>Code that controls swimming doesn’t have to deal with the noise of non-swim related members.</a:t>
+            </a:r>
+          </a:p>
+          <a:p>
+            <a:r>
+              <a:rPr lang="en-US" baseline="0" dirty="0" err="1" smtClean="0"/>
+              <a:t>Liskov</a:t>
+            </a:r>
+            <a:r>
+              <a:rPr lang="en-US" baseline="0" dirty="0" smtClean="0"/>
+              <a:t> can be at play now; code related to flight can work regardless of actual type.</a:t>
+            </a:r>
+          </a:p>
+          <a:p>
+            <a:r>
+              <a:rPr lang="en-US" baseline="0" dirty="0" smtClean="0"/>
+              <a:t>Room for improvement; since fish almost always swim, abstract base class </a:t>
+            </a:r>
+            <a:r>
+              <a:rPr lang="en-US" baseline="0" dirty="0" err="1" smtClean="0"/>
+              <a:t>SwimmingFish</a:t>
+            </a:r>
+            <a:r>
+              <a:rPr lang="en-US" baseline="0" dirty="0" smtClean="0"/>
+              <a:t> can be introduced</a:t>
+            </a:r>
+          </a:p>
+          <a:p>
+            <a:endParaRPr lang="en-US" dirty="0"/>
+          </a:p>
+        </p:txBody>
+      </p:sp>
+      <p:sp>
+        <p:nvSpPr>
+          <p:cNvPr id="4" name="Slide Number Placeholder 3"/>
+          <p:cNvSpPr>
+            <a:spLocks noGrp="1"/>
+          </p:cNvSpPr>
+          <p:nvPr>
+            <p:ph type="sldNum" sz="quarter" idx="10"/>
+          </p:nvPr>
+        </p:nvSpPr>
+        <p:spPr/>
+        <p:txBody>
+          <a:bodyPr/>
+          <a:lstStyle/>
+          <a:p>
+            <a:fld id="{5E646BB7-50E9-43CE-B8D8-A01580F287EB}" type="slidenum">
+              <a:rPr lang="en-US" smtClean="0"/>
+              <a:t>8</a:t>
+            </a:fld>
+            <a:endParaRPr lang="en-US"/>
+          </a:p>
+        </p:txBody>
+      </p:sp>
+    </p:spTree>
+    <p:extLst>
+      <p:ext uri="{BB962C8B-B14F-4D97-AF65-F5344CB8AC3E}">
+        <p14:creationId xmlns:p14="http://schemas.microsoft.com/office/powerpoint/2010/main" val="1557589058"/>
       </p:ext>
     </p:extLst>
   </p:cSld>
@@ -37941,11 +38210,7 @@
             <a:pPr lvl="1"/>
             <a:r>
               <a:rPr lang="en-US" sz="1800" dirty="0" smtClean="0"/>
-              <a:t>Aliens are substitutable for Obstacle or </a:t>
-            </a:r>
-            <a:r>
-              <a:rPr lang="en-US" sz="1800" dirty="0" smtClean="0"/>
-              <a:t>Crater</a:t>
+              <a:t>Aliens are substitutable for Obstacle or Crater</a:t>
             </a:r>
           </a:p>
           <a:p>
@@ -37959,11 +38224,7 @@
           <a:p>
             <a:r>
               <a:rPr lang="en-US" sz="2400" dirty="0" smtClean="0"/>
-              <a:t>ISP</a:t>
-            </a:r>
-            <a:r>
-              <a:rPr lang="en-US" sz="2400" dirty="0" smtClean="0"/>
-              <a:t>:</a:t>
+              <a:t>ISP:</a:t>
             </a:r>
           </a:p>
           <a:p>
@@ -38390,7 +38651,7 @@
     <p:bg>
       <p:bgPr>
         <a:blipFill dpi="0" rotWithShape="1">
-          <a:blip r:embed="rId2">
+          <a:blip r:embed="rId3">
             <a:lum/>
           </a:blip>
           <a:srcRect/>
@@ -38440,11 +38701,7 @@
             </a:r>
             <a:r>
               <a:rPr lang="en-US" dirty="0" smtClean="0"/>
-              <a:t> </a:t>
-            </a:r>
-            <a:r>
-              <a:rPr lang="en-US" dirty="0" smtClean="0"/>
-              <a:t>Substitution?</a:t>
+              <a:t> Substitution?</a:t>
             </a:r>
             <a:endParaRPr lang="en-US" dirty="0"/>
           </a:p>
@@ -38838,15 +39095,7 @@
           <a:p>
             <a:r>
               <a:rPr lang="en-US" dirty="0" smtClean="0"/>
-              <a:t>LOB Application</a:t>
-            </a:r>
-            <a:r>
-              <a:rPr lang="en-US" dirty="0" smtClean="0"/>
-              <a:t> </a:t>
-            </a:r>
-            <a:r>
-              <a:rPr lang="en-US" dirty="0" smtClean="0"/>
-              <a:t>Example</a:t>
+              <a:t>LOB Application Example</a:t>
             </a:r>
             <a:endParaRPr lang="en-US" dirty="0"/>
           </a:p>
@@ -39173,11 +39422,7 @@
           <a:p>
             <a:r>
               <a:rPr lang="en-US" dirty="0" smtClean="0"/>
-              <a:t>LOB Application Example </a:t>
-            </a:r>
-            <a:r>
-              <a:rPr lang="en-US" dirty="0" smtClean="0"/>
-              <a:t>Revisited</a:t>
+              <a:t>LOB Application Example Revisited</a:t>
             </a:r>
             <a:endParaRPr lang="en-US" dirty="0"/>
           </a:p>
@@ -39416,11 +39661,7 @@
           <a:p>
             <a:r>
               <a:rPr lang="en-US" dirty="0" smtClean="0"/>
-              <a:t>What is Interface </a:t>
-            </a:r>
-            <a:r>
-              <a:rPr lang="en-US" dirty="0" smtClean="0"/>
-              <a:t>Segregation?</a:t>
+              <a:t>What is Interface Segregation?</a:t>
             </a:r>
             <a:endParaRPr lang="en-US" dirty="0"/>
           </a:p>
@@ -39628,7 +39869,7 @@
     <p:bg>
       <p:bgPr>
         <a:blipFill dpi="0" rotWithShape="1">
-          <a:blip r:embed="rId2">
+          <a:blip r:embed="rId3">
             <a:lum/>
           </a:blip>
           <a:srcRect/>
@@ -39686,18 +39927,18 @@
             <p:ph idx="1"/>
             <p:extLst>
               <p:ext uri="{D42A27DB-BD31-4B8C-83A1-F6EECF244321}">
-                <p14:modId xmlns:p14="http://schemas.microsoft.com/office/powerpoint/2010/main" val="3235477127"/>
+                <p14:modId xmlns:p14="http://schemas.microsoft.com/office/powerpoint/2010/main" val="384627253"/>
               </p:ext>
             </p:extLst>
           </p:nvPr>
         </p:nvGraphicFramePr>
         <p:xfrm>
-          <a:off x="299357" y="2135868"/>
-          <a:ext cx="10515600" cy="4351338"/>
+          <a:off x="-342899" y="1690688"/>
+          <a:ext cx="11918372" cy="5167312"/>
         </p:xfrm>
         <a:graphic>
           <a:graphicData uri="http://schemas.openxmlformats.org/drawingml/2006/diagram">
-            <dgm:relIds xmlns:dgm="http://schemas.openxmlformats.org/drawingml/2006/diagram" xmlns:r="http://schemas.openxmlformats.org/officeDocument/2006/relationships" r:dm="rId3" r:lo="rId4" r:qs="rId5" r:cs="rId6"/>
+            <dgm:relIds xmlns:dgm="http://schemas.openxmlformats.org/drawingml/2006/diagram" xmlns:r="http://schemas.openxmlformats.org/officeDocument/2006/relationships" r:dm="rId4" r:lo="rId5" r:qs="rId6" r:cs="rId7"/>
           </a:graphicData>
         </a:graphic>
       </p:graphicFrame>
@@ -39709,8 +39950,8 @@
         </p:nvCxnSpPr>
         <p:spPr>
           <a:xfrm flipH="1">
-            <a:off x="3157946" y="2991394"/>
-            <a:ext cx="2024744" cy="1449977"/>
+            <a:off x="3157946" y="2991392"/>
+            <a:ext cx="1725781" cy="1449979"/>
           </a:xfrm>
           <a:prstGeom prst="line">
             <a:avLst/>
@@ -39769,8 +40010,8 @@
         </p:nvCxnSpPr>
         <p:spPr>
           <a:xfrm>
-            <a:off x="4983480" y="3082833"/>
-            <a:ext cx="1247503" cy="1358537"/>
+            <a:off x="4623955" y="2680855"/>
+            <a:ext cx="1607028" cy="1760515"/>
           </a:xfrm>
           <a:prstGeom prst="line">
             <a:avLst/>
@@ -39960,7 +40201,7 @@
           <p:nvPr>
             <p:extLst>
               <p:ext uri="{D42A27DB-BD31-4B8C-83A1-F6EECF244321}">
-                <p14:modId xmlns:p14="http://schemas.microsoft.com/office/powerpoint/2010/main" val="3535168947"/>
+                <p14:modId xmlns:p14="http://schemas.microsoft.com/office/powerpoint/2010/main" val="4010214320"/>
               </p:ext>
             </p:extLst>
           </p:nvPr>
@@ -39975,6 +40216,43 @@
           </a:graphicData>
         </a:graphic>
       </p:graphicFrame>
+      <p:cxnSp>
+        <p:nvCxnSpPr>
+          <p:cNvPr id="6" name="Straight Connector 5"/>
+          <p:cNvCxnSpPr/>
+          <p:nvPr/>
+        </p:nvCxnSpPr>
+        <p:spPr>
+          <a:xfrm>
+            <a:off x="7559040" y="4737735"/>
+            <a:ext cx="1293495" cy="215265"/>
+          </a:xfrm>
+          <a:prstGeom prst="bentConnector3">
+            <a:avLst>
+              <a:gd name="adj1" fmla="val 368"/>
+            </a:avLst>
+          </a:prstGeom>
+          <a:ln w="12700">
+            <a:solidFill>
+              <a:srgbClr val="528CC1"/>
+            </a:solidFill>
+          </a:ln>
+        </p:spPr>
+        <p:style>
+          <a:lnRef idx="1">
+            <a:schemeClr val="accent1"/>
+          </a:lnRef>
+          <a:fillRef idx="0">
+            <a:schemeClr val="accent1"/>
+          </a:fillRef>
+          <a:effectRef idx="0">
+            <a:schemeClr val="accent1"/>
+          </a:effectRef>
+          <a:fontRef idx="minor">
+            <a:schemeClr val="tx1"/>
+          </a:fontRef>
+        </p:style>
+      </p:cxnSp>
     </p:spTree>
     <p:extLst>
       <p:ext uri="{BB962C8B-B14F-4D97-AF65-F5344CB8AC3E}">

</xml_diff>

<commit_message>
Fixed incorrect LI slides.
</commit_message>
<xml_diff>
--- a/Presentations/LI Redux.pptx
+++ b/Presentations/LI Redux.pptx
@@ -37474,7 +37474,7 @@
           <a:p>
             <a:fld id="{D7D9A16F-D302-4F6C-88DE-469A6962F06E}" type="datetimeFigureOut">
               <a:rPr lang="en-US" smtClean="0"/>
-              <a:t>1/3/2015</a:t>
+              <a:t>1/4/2015</a:t>
             </a:fld>
             <a:endParaRPr lang="en-US"/>
           </a:p>
@@ -38536,7 +38536,7 @@
           <a:p>
             <a:fld id="{ABF9AFE4-9910-4F36-8626-ABF2E797B655}" type="datetimeFigureOut">
               <a:rPr lang="en-US" smtClean="0"/>
-              <a:t>1/3/2015</a:t>
+              <a:t>1/4/2015</a:t>
             </a:fld>
             <a:endParaRPr lang="en-US"/>
           </a:p>
@@ -38706,7 +38706,7 @@
           <a:p>
             <a:fld id="{ABF9AFE4-9910-4F36-8626-ABF2E797B655}" type="datetimeFigureOut">
               <a:rPr lang="en-US" smtClean="0"/>
-              <a:t>1/3/2015</a:t>
+              <a:t>1/4/2015</a:t>
             </a:fld>
             <a:endParaRPr lang="en-US"/>
           </a:p>
@@ -38886,7 +38886,7 @@
           <a:p>
             <a:fld id="{ABF9AFE4-9910-4F36-8626-ABF2E797B655}" type="datetimeFigureOut">
               <a:rPr lang="en-US" smtClean="0"/>
-              <a:t>1/3/2015</a:t>
+              <a:t>1/4/2015</a:t>
             </a:fld>
             <a:endParaRPr lang="en-US"/>
           </a:p>
@@ -39056,7 +39056,7 @@
           <a:p>
             <a:fld id="{ABF9AFE4-9910-4F36-8626-ABF2E797B655}" type="datetimeFigureOut">
               <a:rPr lang="en-US" smtClean="0"/>
-              <a:t>1/3/2015</a:t>
+              <a:t>1/4/2015</a:t>
             </a:fld>
             <a:endParaRPr lang="en-US"/>
           </a:p>
@@ -39302,7 +39302,7 @@
           <a:p>
             <a:fld id="{ABF9AFE4-9910-4F36-8626-ABF2E797B655}" type="datetimeFigureOut">
               <a:rPr lang="en-US" smtClean="0"/>
-              <a:t>1/3/2015</a:t>
+              <a:t>1/4/2015</a:t>
             </a:fld>
             <a:endParaRPr lang="en-US"/>
           </a:p>
@@ -39534,7 +39534,7 @@
           <a:p>
             <a:fld id="{ABF9AFE4-9910-4F36-8626-ABF2E797B655}" type="datetimeFigureOut">
               <a:rPr lang="en-US" smtClean="0"/>
-              <a:t>1/3/2015</a:t>
+              <a:t>1/4/2015</a:t>
             </a:fld>
             <a:endParaRPr lang="en-US"/>
           </a:p>
@@ -39901,7 +39901,7 @@
           <a:p>
             <a:fld id="{ABF9AFE4-9910-4F36-8626-ABF2E797B655}" type="datetimeFigureOut">
               <a:rPr lang="en-US" smtClean="0"/>
-              <a:t>1/3/2015</a:t>
+              <a:t>1/4/2015</a:t>
             </a:fld>
             <a:endParaRPr lang="en-US"/>
           </a:p>
@@ -40019,7 +40019,7 @@
           <a:p>
             <a:fld id="{ABF9AFE4-9910-4F36-8626-ABF2E797B655}" type="datetimeFigureOut">
               <a:rPr lang="en-US" smtClean="0"/>
-              <a:t>1/3/2015</a:t>
+              <a:t>1/4/2015</a:t>
             </a:fld>
             <a:endParaRPr lang="en-US"/>
           </a:p>
@@ -40114,7 +40114,7 @@
           <a:p>
             <a:fld id="{ABF9AFE4-9910-4F36-8626-ABF2E797B655}" type="datetimeFigureOut">
               <a:rPr lang="en-US" smtClean="0"/>
-              <a:t>1/3/2015</a:t>
+              <a:t>1/4/2015</a:t>
             </a:fld>
             <a:endParaRPr lang="en-US"/>
           </a:p>
@@ -40391,7 +40391,7 @@
           <a:p>
             <a:fld id="{ABF9AFE4-9910-4F36-8626-ABF2E797B655}" type="datetimeFigureOut">
               <a:rPr lang="en-US" smtClean="0"/>
-              <a:t>1/3/2015</a:t>
+              <a:t>1/4/2015</a:t>
             </a:fld>
             <a:endParaRPr lang="en-US"/>
           </a:p>
@@ -40644,7 +40644,7 @@
           <a:p>
             <a:fld id="{ABF9AFE4-9910-4F36-8626-ABF2E797B655}" type="datetimeFigureOut">
               <a:rPr lang="en-US" smtClean="0"/>
-              <a:t>1/3/2015</a:t>
+              <a:t>1/4/2015</a:t>
             </a:fld>
             <a:endParaRPr lang="en-US"/>
           </a:p>
@@ -40857,7 +40857,7 @@
           <a:p>
             <a:fld id="{ABF9AFE4-9910-4F36-8626-ABF2E797B655}" type="datetimeFigureOut">
               <a:rPr lang="en-US" smtClean="0"/>
-              <a:t>1/3/2015</a:t>
+              <a:t>1/4/2015</a:t>
             </a:fld>
             <a:endParaRPr lang="en-US"/>
           </a:p>
@@ -42277,6 +42277,43 @@
           </a:graphicData>
         </a:graphic>
       </p:graphicFrame>
+      <p:cxnSp>
+        <p:nvCxnSpPr>
+          <p:cNvPr id="5" name="Straight Connector 4"/>
+          <p:cNvCxnSpPr/>
+          <p:nvPr/>
+        </p:nvCxnSpPr>
+        <p:spPr>
+          <a:xfrm rot="10800000" flipV="1">
+            <a:off x="5549900" y="3053078"/>
+            <a:ext cx="2235200" cy="1849121"/>
+          </a:xfrm>
+          <a:prstGeom prst="bentConnector3">
+            <a:avLst>
+              <a:gd name="adj1" fmla="val 99773"/>
+            </a:avLst>
+          </a:prstGeom>
+          <a:ln w="12700">
+            <a:solidFill>
+              <a:srgbClr val="477BA9"/>
+            </a:solidFill>
+          </a:ln>
+        </p:spPr>
+        <p:style>
+          <a:lnRef idx="1">
+            <a:schemeClr val="accent1"/>
+          </a:lnRef>
+          <a:fillRef idx="0">
+            <a:schemeClr val="accent1"/>
+          </a:fillRef>
+          <a:effectRef idx="0">
+            <a:schemeClr val="accent1"/>
+          </a:effectRef>
+          <a:fontRef idx="minor">
+            <a:schemeClr val="tx1"/>
+          </a:fontRef>
+        </p:style>
+      </p:cxnSp>
     </p:spTree>
     <p:extLst>
       <p:ext uri="{BB962C8B-B14F-4D97-AF65-F5344CB8AC3E}">
@@ -44890,6 +44927,36 @@
           </a:fontRef>
         </p:style>
       </p:cxnSp>
+      <p:cxnSp>
+        <p:nvCxnSpPr>
+          <p:cNvPr id="9" name="Straight Connector 8"/>
+          <p:cNvCxnSpPr/>
+          <p:nvPr/>
+        </p:nvCxnSpPr>
+        <p:spPr>
+          <a:xfrm flipH="1">
+            <a:off x="6453051" y="2991392"/>
+            <a:ext cx="165958" cy="1449977"/>
+          </a:xfrm>
+          <a:prstGeom prst="line">
+            <a:avLst/>
+          </a:prstGeom>
+        </p:spPr>
+        <p:style>
+          <a:lnRef idx="1">
+            <a:schemeClr val="accent1"/>
+          </a:lnRef>
+          <a:fillRef idx="0">
+            <a:schemeClr val="accent1"/>
+          </a:fillRef>
+          <a:effectRef idx="0">
+            <a:schemeClr val="accent1"/>
+          </a:effectRef>
+          <a:fontRef idx="minor">
+            <a:schemeClr val="tx1"/>
+          </a:fontRef>
+        </p:style>
+      </p:cxnSp>
     </p:spTree>
     <p:extLst>
       <p:ext uri="{BB962C8B-B14F-4D97-AF65-F5344CB8AC3E}">

</xml_diff>

<commit_message>
Fixed broken LI animation.
</commit_message>
<xml_diff>
--- a/Presentations/LI Redux.pptx
+++ b/Presentations/LI Redux.pptx
@@ -16930,844 +16930,6 @@
       <dsp:cNvGrpSpPr/>
     </dsp:nvGrpSpPr>
     <dsp:grpSpPr/>
-    <dsp:sp modelId="{F3CBE63C-F79F-4C69-8BA7-C5F552EB9DBC}">
-      <dsp:nvSpPr>
-        <dsp:cNvPr id="0" name=""/>
-        <dsp:cNvSpPr/>
-      </dsp:nvSpPr>
-      <dsp:spPr>
-        <a:xfrm>
-          <a:off x="7953491" y="2742076"/>
-          <a:ext cx="91440" cy="475782"/>
-        </a:xfrm>
-        <a:custGeom>
-          <a:avLst/>
-          <a:gdLst/>
-          <a:ahLst/>
-          <a:cxnLst/>
-          <a:rect l="0" t="0" r="0" b="0"/>
-          <a:pathLst>
-            <a:path>
-              <a:moveTo>
-                <a:pt x="45720" y="0"/>
-              </a:moveTo>
-              <a:lnTo>
-                <a:pt x="45720" y="475782"/>
-              </a:lnTo>
-            </a:path>
-          </a:pathLst>
-        </a:custGeom>
-        <a:noFill/>
-        <a:ln w="12700" cap="flat" cmpd="sng" algn="ctr">
-          <a:solidFill>
-            <a:schemeClr val="accent1">
-              <a:shade val="80000"/>
-              <a:hueOff val="0"/>
-              <a:satOff val="0"/>
-              <a:lumOff val="0"/>
-              <a:alphaOff val="0"/>
-            </a:schemeClr>
-          </a:solidFill>
-          <a:prstDash val="solid"/>
-          <a:miter lim="800000"/>
-        </a:ln>
-        <a:effectLst/>
-      </dsp:spPr>
-      <dsp:style>
-        <a:lnRef idx="2">
-          <a:scrgbClr r="0" g="0" b="0"/>
-        </a:lnRef>
-        <a:fillRef idx="0">
-          <a:scrgbClr r="0" g="0" b="0"/>
-        </a:fillRef>
-        <a:effectRef idx="0">
-          <a:scrgbClr r="0" g="0" b="0"/>
-        </a:effectRef>
-        <a:fontRef idx="minor"/>
-      </dsp:style>
-    </dsp:sp>
-    <dsp:sp modelId="{B5176587-7DBE-47D0-971A-F5D95AD067F2}">
-      <dsp:nvSpPr>
-        <dsp:cNvPr id="0" name=""/>
-        <dsp:cNvSpPr/>
-      </dsp:nvSpPr>
-      <dsp:spPr>
-        <a:xfrm>
-          <a:off x="7953491" y="1133479"/>
-          <a:ext cx="91440" cy="475782"/>
-        </a:xfrm>
-        <a:custGeom>
-          <a:avLst/>
-          <a:gdLst/>
-          <a:ahLst/>
-          <a:cxnLst/>
-          <a:rect l="0" t="0" r="0" b="0"/>
-          <a:pathLst>
-            <a:path>
-              <a:moveTo>
-                <a:pt x="45720" y="0"/>
-              </a:moveTo>
-              <a:lnTo>
-                <a:pt x="45720" y="475782"/>
-              </a:lnTo>
-            </a:path>
-          </a:pathLst>
-        </a:custGeom>
-        <a:noFill/>
-        <a:ln w="12700" cap="flat" cmpd="sng" algn="ctr">
-          <a:solidFill>
-            <a:schemeClr val="accent1">
-              <a:shade val="60000"/>
-              <a:hueOff val="0"/>
-              <a:satOff val="0"/>
-              <a:lumOff val="0"/>
-              <a:alphaOff val="0"/>
-            </a:schemeClr>
-          </a:solidFill>
-          <a:prstDash val="solid"/>
-          <a:miter lim="800000"/>
-        </a:ln>
-        <a:effectLst/>
-      </dsp:spPr>
-      <dsp:style>
-        <a:lnRef idx="2">
-          <a:scrgbClr r="0" g="0" b="0"/>
-        </a:lnRef>
-        <a:fillRef idx="0">
-          <a:scrgbClr r="0" g="0" b="0"/>
-        </a:fillRef>
-        <a:effectRef idx="0">
-          <a:scrgbClr r="0" g="0" b="0"/>
-        </a:effectRef>
-        <a:fontRef idx="minor"/>
-      </dsp:style>
-    </dsp:sp>
-    <dsp:sp modelId="{D23F7A85-1910-48EB-A280-EBDEFC3B7DBA}">
-      <dsp:nvSpPr>
-        <dsp:cNvPr id="0" name=""/>
-        <dsp:cNvSpPr/>
-      </dsp:nvSpPr>
-      <dsp:spPr>
-        <a:xfrm>
-          <a:off x="3887094" y="2742076"/>
-          <a:ext cx="1370705" cy="475782"/>
-        </a:xfrm>
-        <a:custGeom>
-          <a:avLst/>
-          <a:gdLst/>
-          <a:ahLst/>
-          <a:cxnLst/>
-          <a:rect l="0" t="0" r="0" b="0"/>
-          <a:pathLst>
-            <a:path>
-              <a:moveTo>
-                <a:pt x="0" y="0"/>
-              </a:moveTo>
-              <a:lnTo>
-                <a:pt x="0" y="237891"/>
-              </a:lnTo>
-              <a:lnTo>
-                <a:pt x="1370705" y="237891"/>
-              </a:lnTo>
-              <a:lnTo>
-                <a:pt x="1370705" y="475782"/>
-              </a:lnTo>
-            </a:path>
-          </a:pathLst>
-        </a:custGeom>
-        <a:noFill/>
-        <a:ln w="12700" cap="flat" cmpd="sng" algn="ctr">
-          <a:solidFill>
-            <a:schemeClr val="accent1">
-              <a:shade val="80000"/>
-              <a:hueOff val="0"/>
-              <a:satOff val="0"/>
-              <a:lumOff val="0"/>
-              <a:alphaOff val="0"/>
-            </a:schemeClr>
-          </a:solidFill>
-          <a:prstDash val="solid"/>
-          <a:miter lim="800000"/>
-        </a:ln>
-        <a:effectLst/>
-      </dsp:spPr>
-      <dsp:style>
-        <a:lnRef idx="2">
-          <a:scrgbClr r="0" g="0" b="0"/>
-        </a:lnRef>
-        <a:fillRef idx="0">
-          <a:scrgbClr r="0" g="0" b="0"/>
-        </a:fillRef>
-        <a:effectRef idx="0">
-          <a:scrgbClr r="0" g="0" b="0"/>
-        </a:effectRef>
-        <a:fontRef idx="minor"/>
-      </dsp:style>
-    </dsp:sp>
-    <dsp:sp modelId="{E9139A74-ED12-4EA0-B399-C7E2284DA0EF}">
-      <dsp:nvSpPr>
-        <dsp:cNvPr id="0" name=""/>
-        <dsp:cNvSpPr/>
-      </dsp:nvSpPr>
-      <dsp:spPr>
-        <a:xfrm>
-          <a:off x="2516388" y="2742076"/>
-          <a:ext cx="1370705" cy="475782"/>
-        </a:xfrm>
-        <a:custGeom>
-          <a:avLst/>
-          <a:gdLst/>
-          <a:ahLst/>
-          <a:cxnLst/>
-          <a:rect l="0" t="0" r="0" b="0"/>
-          <a:pathLst>
-            <a:path>
-              <a:moveTo>
-                <a:pt x="1370705" y="0"/>
-              </a:moveTo>
-              <a:lnTo>
-                <a:pt x="1370705" y="237891"/>
-              </a:lnTo>
-              <a:lnTo>
-                <a:pt x="0" y="237891"/>
-              </a:lnTo>
-              <a:lnTo>
-                <a:pt x="0" y="475782"/>
-              </a:lnTo>
-            </a:path>
-          </a:pathLst>
-        </a:custGeom>
-        <a:noFill/>
-        <a:ln w="12700" cap="flat" cmpd="sng" algn="ctr">
-          <a:solidFill>
-            <a:schemeClr val="accent1">
-              <a:shade val="80000"/>
-              <a:hueOff val="0"/>
-              <a:satOff val="0"/>
-              <a:lumOff val="0"/>
-              <a:alphaOff val="0"/>
-            </a:schemeClr>
-          </a:solidFill>
-          <a:prstDash val="solid"/>
-          <a:miter lim="800000"/>
-        </a:ln>
-        <a:effectLst/>
-      </dsp:spPr>
-      <dsp:style>
-        <a:lnRef idx="2">
-          <a:scrgbClr r="0" g="0" b="0"/>
-        </a:lnRef>
-        <a:fillRef idx="0">
-          <a:scrgbClr r="0" g="0" b="0"/>
-        </a:fillRef>
-        <a:effectRef idx="0">
-          <a:scrgbClr r="0" g="0" b="0"/>
-        </a:effectRef>
-        <a:fontRef idx="minor"/>
-      </dsp:style>
-    </dsp:sp>
-    <dsp:sp modelId="{D8D9287B-F5B8-437E-A4A4-6CDD247DAEAE}">
-      <dsp:nvSpPr>
-        <dsp:cNvPr id="0" name=""/>
-        <dsp:cNvSpPr/>
-      </dsp:nvSpPr>
-      <dsp:spPr>
-        <a:xfrm>
-          <a:off x="3841374" y="1133479"/>
-          <a:ext cx="91440" cy="475782"/>
-        </a:xfrm>
-        <a:custGeom>
-          <a:avLst/>
-          <a:gdLst/>
-          <a:ahLst/>
-          <a:cxnLst/>
-          <a:rect l="0" t="0" r="0" b="0"/>
-          <a:pathLst>
-            <a:path>
-              <a:moveTo>
-                <a:pt x="45720" y="0"/>
-              </a:moveTo>
-              <a:lnTo>
-                <a:pt x="45720" y="475782"/>
-              </a:lnTo>
-            </a:path>
-          </a:pathLst>
-        </a:custGeom>
-        <a:noFill/>
-        <a:ln w="12700" cap="flat" cmpd="sng" algn="ctr">
-          <a:solidFill>
-            <a:schemeClr val="accent1">
-              <a:shade val="60000"/>
-              <a:hueOff val="0"/>
-              <a:satOff val="0"/>
-              <a:lumOff val="0"/>
-              <a:alphaOff val="0"/>
-            </a:schemeClr>
-          </a:solidFill>
-          <a:prstDash val="solid"/>
-          <a:miter lim="800000"/>
-        </a:ln>
-        <a:effectLst/>
-      </dsp:spPr>
-      <dsp:style>
-        <a:lnRef idx="2">
-          <a:scrgbClr r="0" g="0" b="0"/>
-        </a:lnRef>
-        <a:fillRef idx="0">
-          <a:scrgbClr r="0" g="0" b="0"/>
-        </a:fillRef>
-        <a:effectRef idx="0">
-          <a:scrgbClr r="0" g="0" b="0"/>
-        </a:effectRef>
-        <a:fontRef idx="minor"/>
-      </dsp:style>
-    </dsp:sp>
-    <dsp:sp modelId="{668C4EE9-2EBA-48C7-9832-0FA2683C1ABF}">
-      <dsp:nvSpPr>
-        <dsp:cNvPr id="0" name=""/>
-        <dsp:cNvSpPr/>
-      </dsp:nvSpPr>
-      <dsp:spPr>
-        <a:xfrm>
-          <a:off x="2754279" y="665"/>
-          <a:ext cx="2265629" cy="1132814"/>
-        </a:xfrm>
-        <a:prstGeom prst="rect">
-          <a:avLst/>
-        </a:prstGeom>
-        <a:solidFill>
-          <a:schemeClr val="accent1">
-            <a:hueOff val="0"/>
-            <a:satOff val="0"/>
-            <a:lumOff val="0"/>
-            <a:alphaOff val="0"/>
-          </a:schemeClr>
-        </a:solidFill>
-        <a:ln w="12700" cap="flat" cmpd="sng" algn="ctr">
-          <a:solidFill>
-            <a:schemeClr val="lt1">
-              <a:hueOff val="0"/>
-              <a:satOff val="0"/>
-              <a:lumOff val="0"/>
-              <a:alphaOff val="0"/>
-            </a:schemeClr>
-          </a:solidFill>
-          <a:prstDash val="solid"/>
-          <a:miter lim="800000"/>
-        </a:ln>
-        <a:effectLst/>
-      </dsp:spPr>
-      <dsp:style>
-        <a:lnRef idx="2">
-          <a:scrgbClr r="0" g="0" b="0"/>
-        </a:lnRef>
-        <a:fillRef idx="1">
-          <a:scrgbClr r="0" g="0" b="0"/>
-        </a:fillRef>
-        <a:effectRef idx="0">
-          <a:scrgbClr r="0" g="0" b="0"/>
-        </a:effectRef>
-        <a:fontRef idx="minor">
-          <a:schemeClr val="lt1"/>
-        </a:fontRef>
-      </dsp:style>
-      <dsp:txBody>
-        <a:bodyPr spcFirstLastPara="0" vert="horz" wrap="square" lIns="28575" tIns="28575" rIns="28575" bIns="28575" numCol="1" spcCol="1270" anchor="ctr" anchorCtr="0">
-          <a:noAutofit/>
-        </a:bodyPr>
-        <a:lstStyle/>
-        <a:p>
-          <a:pPr lvl="0" algn="ctr" defTabSz="2000250">
-            <a:lnSpc>
-              <a:spcPct val="90000"/>
-            </a:lnSpc>
-            <a:spcBef>
-              <a:spcPct val="0"/>
-            </a:spcBef>
-            <a:spcAft>
-              <a:spcPct val="35000"/>
-            </a:spcAft>
-          </a:pPr>
-          <a:r>
-            <a:rPr lang="en-US" sz="4500" kern="1200" dirty="0" err="1" smtClean="0"/>
-            <a:t>IMovable</a:t>
-          </a:r>
-          <a:endParaRPr lang="en-US" sz="4500" kern="1200" dirty="0"/>
-        </a:p>
-      </dsp:txBody>
-      <dsp:txXfrm>
-        <a:off x="2754279" y="665"/>
-        <a:ext cx="2265629" cy="1132814"/>
-      </dsp:txXfrm>
-    </dsp:sp>
-    <dsp:sp modelId="{152AA4C6-13C9-46E5-A1C4-470A8E17A32E}">
-      <dsp:nvSpPr>
-        <dsp:cNvPr id="0" name=""/>
-        <dsp:cNvSpPr/>
-      </dsp:nvSpPr>
-      <dsp:spPr>
-        <a:xfrm>
-          <a:off x="2754279" y="1609261"/>
-          <a:ext cx="2265629" cy="1132814"/>
-        </a:xfrm>
-        <a:prstGeom prst="rect">
-          <a:avLst/>
-        </a:prstGeom>
-        <a:solidFill>
-          <a:schemeClr val="accent1">
-            <a:hueOff val="0"/>
-            <a:satOff val="0"/>
-            <a:lumOff val="0"/>
-            <a:alphaOff val="0"/>
-          </a:schemeClr>
-        </a:solidFill>
-        <a:ln w="12700" cap="flat" cmpd="sng" algn="ctr">
-          <a:solidFill>
-            <a:schemeClr val="lt1">
-              <a:hueOff val="0"/>
-              <a:satOff val="0"/>
-              <a:lumOff val="0"/>
-              <a:alphaOff val="0"/>
-            </a:schemeClr>
-          </a:solidFill>
-          <a:prstDash val="solid"/>
-          <a:miter lim="800000"/>
-        </a:ln>
-        <a:effectLst/>
-      </dsp:spPr>
-      <dsp:style>
-        <a:lnRef idx="2">
-          <a:scrgbClr r="0" g="0" b="0"/>
-        </a:lnRef>
-        <a:fillRef idx="1">
-          <a:scrgbClr r="0" g="0" b="0"/>
-        </a:fillRef>
-        <a:effectRef idx="0">
-          <a:scrgbClr r="0" g="0" b="0"/>
-        </a:effectRef>
-        <a:fontRef idx="minor">
-          <a:schemeClr val="lt1"/>
-        </a:fontRef>
-      </dsp:style>
-      <dsp:txBody>
-        <a:bodyPr spcFirstLastPara="0" vert="horz" wrap="square" lIns="28575" tIns="28575" rIns="28575" bIns="28575" numCol="1" spcCol="1270" anchor="ctr" anchorCtr="0">
-          <a:noAutofit/>
-        </a:bodyPr>
-        <a:lstStyle/>
-        <a:p>
-          <a:pPr lvl="0" algn="ctr" defTabSz="2000250">
-            <a:lnSpc>
-              <a:spcPct val="90000"/>
-            </a:lnSpc>
-            <a:spcBef>
-              <a:spcPct val="0"/>
-            </a:spcBef>
-            <a:spcAft>
-              <a:spcPct val="35000"/>
-            </a:spcAft>
-          </a:pPr>
-          <a:r>
-            <a:rPr lang="en-US" sz="4500" kern="1200" dirty="0" smtClean="0"/>
-            <a:t>Movable</a:t>
-          </a:r>
-          <a:endParaRPr lang="en-US" sz="4500" kern="1200" dirty="0"/>
-        </a:p>
-      </dsp:txBody>
-      <dsp:txXfrm>
-        <a:off x="2754279" y="1609261"/>
-        <a:ext cx="2265629" cy="1132814"/>
-      </dsp:txXfrm>
-    </dsp:sp>
-    <dsp:sp modelId="{943882F0-E497-44DA-92CD-E8CAA46A4553}">
-      <dsp:nvSpPr>
-        <dsp:cNvPr id="0" name=""/>
-        <dsp:cNvSpPr/>
-      </dsp:nvSpPr>
-      <dsp:spPr>
-        <a:xfrm>
-          <a:off x="1383574" y="3217858"/>
-          <a:ext cx="2265629" cy="1132814"/>
-        </a:xfrm>
-        <a:prstGeom prst="rect">
-          <a:avLst/>
-        </a:prstGeom>
-        <a:solidFill>
-          <a:schemeClr val="accent1">
-            <a:hueOff val="0"/>
-            <a:satOff val="0"/>
-            <a:lumOff val="0"/>
-            <a:alphaOff val="0"/>
-          </a:schemeClr>
-        </a:solidFill>
-        <a:ln w="12700" cap="flat" cmpd="sng" algn="ctr">
-          <a:solidFill>
-            <a:schemeClr val="lt1">
-              <a:hueOff val="0"/>
-              <a:satOff val="0"/>
-              <a:lumOff val="0"/>
-              <a:alphaOff val="0"/>
-            </a:schemeClr>
-          </a:solidFill>
-          <a:prstDash val="solid"/>
-          <a:miter lim="800000"/>
-        </a:ln>
-        <a:effectLst/>
-      </dsp:spPr>
-      <dsp:style>
-        <a:lnRef idx="2">
-          <a:scrgbClr r="0" g="0" b="0"/>
-        </a:lnRef>
-        <a:fillRef idx="1">
-          <a:scrgbClr r="0" g="0" b="0"/>
-        </a:fillRef>
-        <a:effectRef idx="0">
-          <a:scrgbClr r="0" g="0" b="0"/>
-        </a:effectRef>
-        <a:fontRef idx="minor">
-          <a:schemeClr val="lt1"/>
-        </a:fontRef>
-      </dsp:style>
-      <dsp:txBody>
-        <a:bodyPr spcFirstLastPara="0" vert="horz" wrap="square" lIns="28575" tIns="28575" rIns="28575" bIns="28575" numCol="1" spcCol="1270" anchor="ctr" anchorCtr="0">
-          <a:noAutofit/>
-        </a:bodyPr>
-        <a:lstStyle/>
-        <a:p>
-          <a:pPr lvl="0" algn="ctr" defTabSz="2000250">
-            <a:lnSpc>
-              <a:spcPct val="90000"/>
-            </a:lnSpc>
-            <a:spcBef>
-              <a:spcPct val="0"/>
-            </a:spcBef>
-            <a:spcAft>
-              <a:spcPct val="35000"/>
-            </a:spcAft>
-          </a:pPr>
-          <a:r>
-            <a:rPr lang="en-US" sz="4500" kern="1200" dirty="0" smtClean="0"/>
-            <a:t>Rover</a:t>
-          </a:r>
-          <a:endParaRPr lang="en-US" sz="4500" kern="1200" dirty="0"/>
-        </a:p>
-      </dsp:txBody>
-      <dsp:txXfrm>
-        <a:off x="1383574" y="3217858"/>
-        <a:ext cx="2265629" cy="1132814"/>
-      </dsp:txXfrm>
-    </dsp:sp>
-    <dsp:sp modelId="{28A5AC14-A835-45DD-A04E-A6BC5F261C91}">
-      <dsp:nvSpPr>
-        <dsp:cNvPr id="0" name=""/>
-        <dsp:cNvSpPr/>
-      </dsp:nvSpPr>
-      <dsp:spPr>
-        <a:xfrm>
-          <a:off x="4124985" y="3217858"/>
-          <a:ext cx="2265629" cy="1132814"/>
-        </a:xfrm>
-        <a:prstGeom prst="rect">
-          <a:avLst/>
-        </a:prstGeom>
-        <a:solidFill>
-          <a:schemeClr val="accent1">
-            <a:hueOff val="0"/>
-            <a:satOff val="0"/>
-            <a:lumOff val="0"/>
-            <a:alphaOff val="0"/>
-          </a:schemeClr>
-        </a:solidFill>
-        <a:ln w="12700" cap="flat" cmpd="sng" algn="ctr">
-          <a:solidFill>
-            <a:schemeClr val="lt1">
-              <a:hueOff val="0"/>
-              <a:satOff val="0"/>
-              <a:lumOff val="0"/>
-              <a:alphaOff val="0"/>
-            </a:schemeClr>
-          </a:solidFill>
-          <a:prstDash val="solid"/>
-          <a:miter lim="800000"/>
-        </a:ln>
-        <a:effectLst/>
-      </dsp:spPr>
-      <dsp:style>
-        <a:lnRef idx="2">
-          <a:scrgbClr r="0" g="0" b="0"/>
-        </a:lnRef>
-        <a:fillRef idx="1">
-          <a:scrgbClr r="0" g="0" b="0"/>
-        </a:fillRef>
-        <a:effectRef idx="0">
-          <a:scrgbClr r="0" g="0" b="0"/>
-        </a:effectRef>
-        <a:fontRef idx="minor">
-          <a:schemeClr val="lt1"/>
-        </a:fontRef>
-      </dsp:style>
-      <dsp:txBody>
-        <a:bodyPr spcFirstLastPara="0" vert="horz" wrap="square" lIns="28575" tIns="28575" rIns="28575" bIns="28575" numCol="1" spcCol="1270" anchor="ctr" anchorCtr="0">
-          <a:noAutofit/>
-        </a:bodyPr>
-        <a:lstStyle/>
-        <a:p>
-          <a:pPr lvl="0" algn="ctr" defTabSz="2000250">
-            <a:lnSpc>
-              <a:spcPct val="90000"/>
-            </a:lnSpc>
-            <a:spcBef>
-              <a:spcPct val="0"/>
-            </a:spcBef>
-            <a:spcAft>
-              <a:spcPct val="35000"/>
-            </a:spcAft>
-          </a:pPr>
-          <a:r>
-            <a:rPr lang="en-US" sz="4500" kern="1200" dirty="0" smtClean="0"/>
-            <a:t>Alien</a:t>
-          </a:r>
-          <a:endParaRPr lang="en-US" sz="4500" kern="1200" dirty="0"/>
-        </a:p>
-      </dsp:txBody>
-      <dsp:txXfrm>
-        <a:off x="4124985" y="3217858"/>
-        <a:ext cx="2265629" cy="1132814"/>
-      </dsp:txXfrm>
-    </dsp:sp>
-    <dsp:sp modelId="{0E9257AF-3A88-499B-B8B0-573519ED7D65}">
-      <dsp:nvSpPr>
-        <dsp:cNvPr id="0" name=""/>
-        <dsp:cNvSpPr/>
-      </dsp:nvSpPr>
-      <dsp:spPr>
-        <a:xfrm>
-          <a:off x="6866396" y="665"/>
-          <a:ext cx="2265629" cy="1132814"/>
-        </a:xfrm>
-        <a:prstGeom prst="rect">
-          <a:avLst/>
-        </a:prstGeom>
-        <a:solidFill>
-          <a:schemeClr val="accent1">
-            <a:hueOff val="0"/>
-            <a:satOff val="0"/>
-            <a:lumOff val="0"/>
-            <a:alphaOff val="0"/>
-          </a:schemeClr>
-        </a:solidFill>
-        <a:ln w="12700" cap="flat" cmpd="sng" algn="ctr">
-          <a:solidFill>
-            <a:schemeClr val="lt1">
-              <a:hueOff val="0"/>
-              <a:satOff val="0"/>
-              <a:lumOff val="0"/>
-              <a:alphaOff val="0"/>
-            </a:schemeClr>
-          </a:solidFill>
-          <a:prstDash val="solid"/>
-          <a:miter lim="800000"/>
-        </a:ln>
-        <a:effectLst/>
-      </dsp:spPr>
-      <dsp:style>
-        <a:lnRef idx="2">
-          <a:scrgbClr r="0" g="0" b="0"/>
-        </a:lnRef>
-        <a:fillRef idx="1">
-          <a:scrgbClr r="0" g="0" b="0"/>
-        </a:fillRef>
-        <a:effectRef idx="0">
-          <a:scrgbClr r="0" g="0" b="0"/>
-        </a:effectRef>
-        <a:fontRef idx="minor">
-          <a:schemeClr val="lt1"/>
-        </a:fontRef>
-      </dsp:style>
-      <dsp:txBody>
-        <a:bodyPr spcFirstLastPara="0" vert="horz" wrap="square" lIns="28575" tIns="28575" rIns="28575" bIns="28575" numCol="1" spcCol="1270" anchor="ctr" anchorCtr="0">
-          <a:noAutofit/>
-        </a:bodyPr>
-        <a:lstStyle/>
-        <a:p>
-          <a:pPr lvl="0" algn="ctr" defTabSz="2000250">
-            <a:lnSpc>
-              <a:spcPct val="90000"/>
-            </a:lnSpc>
-            <a:spcBef>
-              <a:spcPct val="0"/>
-            </a:spcBef>
-            <a:spcAft>
-              <a:spcPct val="35000"/>
-            </a:spcAft>
-          </a:pPr>
-          <a:r>
-            <a:rPr lang="en-US" sz="4500" kern="1200" dirty="0" err="1" smtClean="0"/>
-            <a:t>IObstacle</a:t>
-          </a:r>
-          <a:endParaRPr lang="en-US" sz="4500" kern="1200" dirty="0"/>
-        </a:p>
-      </dsp:txBody>
-      <dsp:txXfrm>
-        <a:off x="6866396" y="665"/>
-        <a:ext cx="2265629" cy="1132814"/>
-      </dsp:txXfrm>
-    </dsp:sp>
-    <dsp:sp modelId="{3047195B-8642-45E2-81D6-495D82B88FCA}">
-      <dsp:nvSpPr>
-        <dsp:cNvPr id="0" name=""/>
-        <dsp:cNvSpPr/>
-      </dsp:nvSpPr>
-      <dsp:spPr>
-        <a:xfrm>
-          <a:off x="6866396" y="1609261"/>
-          <a:ext cx="2265629" cy="1132814"/>
-        </a:xfrm>
-        <a:prstGeom prst="rect">
-          <a:avLst/>
-        </a:prstGeom>
-        <a:solidFill>
-          <a:schemeClr val="accent1">
-            <a:hueOff val="0"/>
-            <a:satOff val="0"/>
-            <a:lumOff val="0"/>
-            <a:alphaOff val="0"/>
-          </a:schemeClr>
-        </a:solidFill>
-        <a:ln w="12700" cap="flat" cmpd="sng" algn="ctr">
-          <a:solidFill>
-            <a:schemeClr val="lt1">
-              <a:hueOff val="0"/>
-              <a:satOff val="0"/>
-              <a:lumOff val="0"/>
-              <a:alphaOff val="0"/>
-            </a:schemeClr>
-          </a:solidFill>
-          <a:prstDash val="solid"/>
-          <a:miter lim="800000"/>
-        </a:ln>
-        <a:effectLst/>
-      </dsp:spPr>
-      <dsp:style>
-        <a:lnRef idx="2">
-          <a:scrgbClr r="0" g="0" b="0"/>
-        </a:lnRef>
-        <a:fillRef idx="1">
-          <a:scrgbClr r="0" g="0" b="0"/>
-        </a:fillRef>
-        <a:effectRef idx="0">
-          <a:scrgbClr r="0" g="0" b="0"/>
-        </a:effectRef>
-        <a:fontRef idx="minor">
-          <a:schemeClr val="lt1"/>
-        </a:fontRef>
-      </dsp:style>
-      <dsp:txBody>
-        <a:bodyPr spcFirstLastPara="0" vert="horz" wrap="square" lIns="28575" tIns="28575" rIns="28575" bIns="28575" numCol="1" spcCol="1270" anchor="ctr" anchorCtr="0">
-          <a:noAutofit/>
-        </a:bodyPr>
-        <a:lstStyle/>
-        <a:p>
-          <a:pPr lvl="0" algn="ctr" defTabSz="2000250">
-            <a:lnSpc>
-              <a:spcPct val="90000"/>
-            </a:lnSpc>
-            <a:spcBef>
-              <a:spcPct val="0"/>
-            </a:spcBef>
-            <a:spcAft>
-              <a:spcPct val="35000"/>
-            </a:spcAft>
-          </a:pPr>
-          <a:r>
-            <a:rPr lang="en-US" sz="4500" kern="1200" dirty="0" smtClean="0"/>
-            <a:t>Obstacle</a:t>
-          </a:r>
-          <a:endParaRPr lang="en-US" sz="4500" kern="1200" dirty="0"/>
-        </a:p>
-      </dsp:txBody>
-      <dsp:txXfrm>
-        <a:off x="6866396" y="1609261"/>
-        <a:ext cx="2265629" cy="1132814"/>
-      </dsp:txXfrm>
-    </dsp:sp>
-    <dsp:sp modelId="{AF7D64D2-0691-4749-8216-78324B4770F6}">
-      <dsp:nvSpPr>
-        <dsp:cNvPr id="0" name=""/>
-        <dsp:cNvSpPr/>
-      </dsp:nvSpPr>
-      <dsp:spPr>
-        <a:xfrm>
-          <a:off x="6866396" y="3217858"/>
-          <a:ext cx="2265629" cy="1132814"/>
-        </a:xfrm>
-        <a:prstGeom prst="rect">
-          <a:avLst/>
-        </a:prstGeom>
-        <a:solidFill>
-          <a:schemeClr val="accent1">
-            <a:hueOff val="0"/>
-            <a:satOff val="0"/>
-            <a:lumOff val="0"/>
-            <a:alphaOff val="0"/>
-          </a:schemeClr>
-        </a:solidFill>
-        <a:ln w="12700" cap="flat" cmpd="sng" algn="ctr">
-          <a:solidFill>
-            <a:schemeClr val="lt1">
-              <a:hueOff val="0"/>
-              <a:satOff val="0"/>
-              <a:lumOff val="0"/>
-              <a:alphaOff val="0"/>
-            </a:schemeClr>
-          </a:solidFill>
-          <a:prstDash val="solid"/>
-          <a:miter lim="800000"/>
-        </a:ln>
-        <a:effectLst/>
-      </dsp:spPr>
-      <dsp:style>
-        <a:lnRef idx="2">
-          <a:scrgbClr r="0" g="0" b="0"/>
-        </a:lnRef>
-        <a:fillRef idx="1">
-          <a:scrgbClr r="0" g="0" b="0"/>
-        </a:fillRef>
-        <a:effectRef idx="0">
-          <a:scrgbClr r="0" g="0" b="0"/>
-        </a:effectRef>
-        <a:fontRef idx="minor">
-          <a:schemeClr val="lt1"/>
-        </a:fontRef>
-      </dsp:style>
-      <dsp:txBody>
-        <a:bodyPr spcFirstLastPara="0" vert="horz" wrap="square" lIns="28575" tIns="28575" rIns="28575" bIns="28575" numCol="1" spcCol="1270" anchor="ctr" anchorCtr="0">
-          <a:noAutofit/>
-        </a:bodyPr>
-        <a:lstStyle/>
-        <a:p>
-          <a:pPr lvl="0" algn="ctr" defTabSz="2000250">
-            <a:lnSpc>
-              <a:spcPct val="90000"/>
-            </a:lnSpc>
-            <a:spcBef>
-              <a:spcPct val="0"/>
-            </a:spcBef>
-            <a:spcAft>
-              <a:spcPct val="35000"/>
-            </a:spcAft>
-          </a:pPr>
-          <a:r>
-            <a:rPr lang="en-US" sz="4500" kern="1200" dirty="0" smtClean="0"/>
-            <a:t>Crater</a:t>
-          </a:r>
-          <a:endParaRPr lang="en-US" sz="4500" kern="1200" dirty="0"/>
-        </a:p>
-      </dsp:txBody>
-      <dsp:txXfrm>
-        <a:off x="6866396" y="3217858"/>
-        <a:ext cx="2265629" cy="1132814"/>
-      </dsp:txXfrm>
-    </dsp:sp>
   </dsp:spTree>
 </dsp:drawing>
 </file>
@@ -44482,125 +43644,9 @@
   <p:timing>
     <p:tnLst>
       <p:par>
-        <p:cTn id="1" dur="indefinite" restart="never" nodeType="tmRoot">
-          <p:childTnLst>
-            <p:seq concurrent="1" nextAc="seek">
-              <p:cTn id="2" dur="indefinite" nodeType="mainSeq">
-                <p:childTnLst>
-                  <p:par>
-                    <p:cTn id="3" fill="hold">
-                      <p:stCondLst>
-                        <p:cond delay="indefinite"/>
-                      </p:stCondLst>
-                      <p:childTnLst>
-                        <p:par>
-                          <p:cTn id="4" fill="hold">
-                            <p:stCondLst>
-                              <p:cond delay="0"/>
-                            </p:stCondLst>
-                            <p:childTnLst>
-                              <p:par>
-                                <p:cTn id="5" presetID="10" presetClass="entr" presetSubtype="0" fill="hold" grpId="0" nodeType="clickEffect">
-                                  <p:stCondLst>
-                                    <p:cond delay="0"/>
-                                  </p:stCondLst>
-                                  <p:childTnLst>
-                                    <p:set>
-                                      <p:cBhvr>
-                                        <p:cTn id="6" dur="1" fill="hold">
-                                          <p:stCondLst>
-                                            <p:cond delay="0"/>
-                                          </p:stCondLst>
-                                        </p:cTn>
-                                        <p:tgtEl>
-                                          <p:spTgt spid="4"/>
-                                        </p:tgtEl>
-                                        <p:attrNameLst>
-                                          <p:attrName>style.visibility</p:attrName>
-                                        </p:attrNameLst>
-                                      </p:cBhvr>
-                                      <p:to>
-                                        <p:strVal val="visible"/>
-                                      </p:to>
-                                    </p:set>
-                                    <p:animEffect transition="in" filter="fade">
-                                      <p:cBhvr>
-                                        <p:cTn id="7" dur="500"/>
-                                        <p:tgtEl>
-                                          <p:spTgt spid="4"/>
-                                        </p:tgtEl>
-                                      </p:cBhvr>
-                                    </p:animEffect>
-                                  </p:childTnLst>
-                                </p:cTn>
-                              </p:par>
-                              <p:par>
-                                <p:cTn id="8" presetID="10" presetClass="entr" presetSubtype="0" fill="hold" nodeType="withEffect">
-                                  <p:stCondLst>
-                                    <p:cond delay="0"/>
-                                  </p:stCondLst>
-                                  <p:childTnLst>
-                                    <p:set>
-                                      <p:cBhvr>
-                                        <p:cTn id="9" dur="1" fill="hold">
-                                          <p:stCondLst>
-                                            <p:cond delay="0"/>
-                                          </p:stCondLst>
-                                        </p:cTn>
-                                        <p:tgtEl>
-                                          <p:spTgt spid="5"/>
-                                        </p:tgtEl>
-                                        <p:attrNameLst>
-                                          <p:attrName>style.visibility</p:attrName>
-                                        </p:attrNameLst>
-                                      </p:cBhvr>
-                                      <p:to>
-                                        <p:strVal val="visible"/>
-                                      </p:to>
-                                    </p:set>
-                                    <p:animEffect transition="in" filter="fade">
-                                      <p:cBhvr>
-                                        <p:cTn id="10" dur="500"/>
-                                        <p:tgtEl>
-                                          <p:spTgt spid="5"/>
-                                        </p:tgtEl>
-                                      </p:cBhvr>
-                                    </p:animEffect>
-                                  </p:childTnLst>
-                                </p:cTn>
-                              </p:par>
-                            </p:childTnLst>
-                          </p:cTn>
-                        </p:par>
-                      </p:childTnLst>
-                    </p:cTn>
-                  </p:par>
-                </p:childTnLst>
-              </p:cTn>
-              <p:prevCondLst>
-                <p:cond evt="onPrev" delay="0">
-                  <p:tgtEl>
-                    <p:sldTgt/>
-                  </p:tgtEl>
-                </p:cond>
-              </p:prevCondLst>
-              <p:nextCondLst>
-                <p:cond evt="onNext" delay="0">
-                  <p:tgtEl>
-                    <p:sldTgt/>
-                  </p:tgtEl>
-                </p:cond>
-              </p:nextCondLst>
-            </p:seq>
-          </p:childTnLst>
-        </p:cTn>
+        <p:cTn id="1" dur="indefinite" restart="never" nodeType="tmRoot"/>
       </p:par>
     </p:tnLst>
-    <p:bldLst>
-      <p:bldGraphic spid="4" grpId="0">
-        <p:bldAsOne/>
-      </p:bldGraphic>
-    </p:bldLst>
   </p:timing>
 </p:sld>
 </file>
@@ -44821,6 +43867,7 @@
           <a:prstGeom prst="line">
             <a:avLst/>
           </a:prstGeom>
+          <a:ln w="12700"/>
         </p:spPr>
         <p:style>
           <a:lnRef idx="1">
@@ -44851,6 +43898,7 @@
           <a:prstGeom prst="line">
             <a:avLst/>
           </a:prstGeom>
+          <a:ln w="12700"/>
         </p:spPr>
         <p:style>
           <a:lnRef idx="1">
@@ -44881,6 +43929,7 @@
           <a:prstGeom prst="line">
             <a:avLst/>
           </a:prstGeom>
+          <a:ln w="12700"/>
         </p:spPr>
         <p:style>
           <a:lnRef idx="1">
@@ -44911,6 +43960,7 @@
           <a:prstGeom prst="line">
             <a:avLst/>
           </a:prstGeom>
+          <a:ln w="12700"/>
         </p:spPr>
         <p:style>
           <a:lnRef idx="1">
@@ -44941,6 +43991,7 @@
           <a:prstGeom prst="line">
             <a:avLst/>
           </a:prstGeom>
+          <a:ln w="12700"/>
         </p:spPr>
         <p:style>
           <a:lnRef idx="1">
@@ -44970,7 +44021,223 @@
   <p:timing>
     <p:tnLst>
       <p:par>
-        <p:cTn id="1" dur="indefinite" restart="never" nodeType="tmRoot"/>
+        <p:cTn id="1" dur="indefinite" restart="never" nodeType="tmRoot">
+          <p:childTnLst>
+            <p:seq concurrent="1" nextAc="seek">
+              <p:cTn id="2" dur="indefinite" nodeType="mainSeq">
+                <p:childTnLst>
+                  <p:par>
+                    <p:cTn id="3" fill="hold">
+                      <p:stCondLst>
+                        <p:cond delay="indefinite"/>
+                      </p:stCondLst>
+                      <p:childTnLst>
+                        <p:par>
+                          <p:cTn id="4" fill="hold">
+                            <p:stCondLst>
+                              <p:cond delay="0"/>
+                            </p:stCondLst>
+                            <p:childTnLst>
+                              <p:par>
+                                <p:cTn id="5" presetID="10" presetClass="entr" presetSubtype="0" fill="hold" nodeType="clickEffect">
+                                  <p:stCondLst>
+                                    <p:cond delay="0"/>
+                                  </p:stCondLst>
+                                  <p:childTnLst>
+                                    <p:set>
+                                      <p:cBhvr>
+                                        <p:cTn id="6" dur="1" fill="hold">
+                                          <p:stCondLst>
+                                            <p:cond delay="0"/>
+                                          </p:stCondLst>
+                                        </p:cTn>
+                                        <p:tgtEl>
+                                          <p:spTgt spid="5"/>
+                                        </p:tgtEl>
+                                        <p:attrNameLst>
+                                          <p:attrName>style.visibility</p:attrName>
+                                        </p:attrNameLst>
+                                      </p:cBhvr>
+                                      <p:to>
+                                        <p:strVal val="visible"/>
+                                      </p:to>
+                                    </p:set>
+                                    <p:animEffect transition="in" filter="fade">
+                                      <p:cBhvr>
+                                        <p:cTn id="7" dur="500"/>
+                                        <p:tgtEl>
+                                          <p:spTgt spid="5"/>
+                                        </p:tgtEl>
+                                      </p:cBhvr>
+                                    </p:animEffect>
+                                  </p:childTnLst>
+                                </p:cTn>
+                              </p:par>
+                              <p:par>
+                                <p:cTn id="8" presetID="10" presetClass="entr" presetSubtype="0" fill="hold" nodeType="withEffect">
+                                  <p:stCondLst>
+                                    <p:cond delay="0"/>
+                                  </p:stCondLst>
+                                  <p:childTnLst>
+                                    <p:set>
+                                      <p:cBhvr>
+                                        <p:cTn id="9" dur="1" fill="hold">
+                                          <p:stCondLst>
+                                            <p:cond delay="0"/>
+                                          </p:stCondLst>
+                                        </p:cTn>
+                                        <p:tgtEl>
+                                          <p:spTgt spid="7"/>
+                                        </p:tgtEl>
+                                        <p:attrNameLst>
+                                          <p:attrName>style.visibility</p:attrName>
+                                        </p:attrNameLst>
+                                      </p:cBhvr>
+                                      <p:to>
+                                        <p:strVal val="visible"/>
+                                      </p:to>
+                                    </p:set>
+                                    <p:animEffect transition="in" filter="fade">
+                                      <p:cBhvr>
+                                        <p:cTn id="10" dur="500"/>
+                                        <p:tgtEl>
+                                          <p:spTgt spid="7"/>
+                                        </p:tgtEl>
+                                      </p:cBhvr>
+                                    </p:animEffect>
+                                  </p:childTnLst>
+                                </p:cTn>
+                              </p:par>
+                              <p:par>
+                                <p:cTn id="11" presetID="10" presetClass="entr" presetSubtype="0" fill="hold" nodeType="withEffect">
+                                  <p:stCondLst>
+                                    <p:cond delay="0"/>
+                                  </p:stCondLst>
+                                  <p:childTnLst>
+                                    <p:set>
+                                      <p:cBhvr>
+                                        <p:cTn id="12" dur="1" fill="hold">
+                                          <p:stCondLst>
+                                            <p:cond delay="0"/>
+                                          </p:stCondLst>
+                                        </p:cTn>
+                                        <p:tgtEl>
+                                          <p:spTgt spid="6"/>
+                                        </p:tgtEl>
+                                        <p:attrNameLst>
+                                          <p:attrName>style.visibility</p:attrName>
+                                        </p:attrNameLst>
+                                      </p:cBhvr>
+                                      <p:to>
+                                        <p:strVal val="visible"/>
+                                      </p:to>
+                                    </p:set>
+                                    <p:animEffect transition="in" filter="fade">
+                                      <p:cBhvr>
+                                        <p:cTn id="13" dur="500"/>
+                                        <p:tgtEl>
+                                          <p:spTgt spid="6"/>
+                                        </p:tgtEl>
+                                      </p:cBhvr>
+                                    </p:animEffect>
+                                  </p:childTnLst>
+                                </p:cTn>
+                              </p:par>
+                              <p:par>
+                                <p:cTn id="14" presetID="10" presetClass="entr" presetSubtype="0" fill="hold" nodeType="withEffect">
+                                  <p:stCondLst>
+                                    <p:cond delay="0"/>
+                                  </p:stCondLst>
+                                  <p:childTnLst>
+                                    <p:set>
+                                      <p:cBhvr>
+                                        <p:cTn id="15" dur="1" fill="hold">
+                                          <p:stCondLst>
+                                            <p:cond delay="0"/>
+                                          </p:stCondLst>
+                                        </p:cTn>
+                                        <p:tgtEl>
+                                          <p:spTgt spid="9"/>
+                                        </p:tgtEl>
+                                        <p:attrNameLst>
+                                          <p:attrName>style.visibility</p:attrName>
+                                        </p:attrNameLst>
+                                      </p:cBhvr>
+                                      <p:to>
+                                        <p:strVal val="visible"/>
+                                      </p:to>
+                                    </p:set>
+                                    <p:animEffect transition="in" filter="fade">
+                                      <p:cBhvr>
+                                        <p:cTn id="16" dur="500"/>
+                                        <p:tgtEl>
+                                          <p:spTgt spid="9"/>
+                                        </p:tgtEl>
+                                      </p:cBhvr>
+                                    </p:animEffect>
+                                  </p:childTnLst>
+                                </p:cTn>
+                              </p:par>
+                              <p:par>
+                                <p:cTn id="17" presetID="10" presetClass="entr" presetSubtype="0" fill="hold" nodeType="withEffect">
+                                  <p:stCondLst>
+                                    <p:cond delay="0"/>
+                                  </p:stCondLst>
+                                  <p:childTnLst>
+                                    <p:set>
+                                      <p:cBhvr>
+                                        <p:cTn id="18" dur="1" fill="hold">
+                                          <p:stCondLst>
+                                            <p:cond delay="0"/>
+                                          </p:stCondLst>
+                                        </p:cTn>
+                                        <p:tgtEl>
+                                          <p:spTgt spid="8"/>
+                                        </p:tgtEl>
+                                        <p:attrNameLst>
+                                          <p:attrName>style.visibility</p:attrName>
+                                        </p:attrNameLst>
+                                      </p:cBhvr>
+                                      <p:to>
+                                        <p:strVal val="visible"/>
+                                      </p:to>
+                                    </p:set>
+                                    <p:animEffect transition="in" filter="fade">
+                                      <p:cBhvr>
+                                        <p:cTn id="19" dur="500"/>
+                                        <p:tgtEl>
+                                          <p:spTgt spid="8"/>
+                                        </p:tgtEl>
+                                      </p:cBhvr>
+                                    </p:animEffect>
+                                  </p:childTnLst>
+                                </p:cTn>
+                              </p:par>
+                            </p:childTnLst>
+                          </p:cTn>
+                        </p:par>
+                      </p:childTnLst>
+                    </p:cTn>
+                  </p:par>
+                </p:childTnLst>
+              </p:cTn>
+              <p:prevCondLst>
+                <p:cond evt="onPrev" delay="0">
+                  <p:tgtEl>
+                    <p:sldTgt/>
+                  </p:tgtEl>
+                </p:cond>
+              </p:prevCondLst>
+              <p:nextCondLst>
+                <p:cond evt="onNext" delay="0">
+                  <p:tgtEl>
+                    <p:sldTgt/>
+                  </p:tgtEl>
+                </p:cond>
+              </p:nextCondLst>
+            </p:seq>
+          </p:childTnLst>
+        </p:cTn>
       </p:par>
     </p:tnLst>
   </p:timing>

</xml_diff>